<commit_message>
Replaced old presentation with new
</commit_message>
<xml_diff>
--- a/presentation/Presentation.pptx
+++ b/presentation/Presentation.pptx
@@ -5,20 +5,24 @@
     <p:sldMasterId id="2147483648" r:id="rId1"/>
   </p:sldMasterIdLst>
   <p:notesMasterIdLst>
-    <p:notesMasterId r:id="rId10"/>
+    <p:notesMasterId r:id="rId14"/>
   </p:notesMasterIdLst>
   <p:handoutMasterIdLst>
-    <p:handoutMasterId r:id="rId11"/>
+    <p:handoutMasterId r:id="rId15"/>
   </p:handoutMasterIdLst>
   <p:sldIdLst>
     <p:sldId id="256" r:id="rId2"/>
-    <p:sldId id="257" r:id="rId3"/>
-    <p:sldId id="258" r:id="rId4"/>
-    <p:sldId id="259" r:id="rId5"/>
-    <p:sldId id="260" r:id="rId6"/>
-    <p:sldId id="261" r:id="rId7"/>
-    <p:sldId id="262" r:id="rId8"/>
-    <p:sldId id="263" r:id="rId9"/>
+    <p:sldId id="266" r:id="rId3"/>
+    <p:sldId id="268" r:id="rId4"/>
+    <p:sldId id="269" r:id="rId5"/>
+    <p:sldId id="267" r:id="rId6"/>
+    <p:sldId id="258" r:id="rId7"/>
+    <p:sldId id="265" r:id="rId8"/>
+    <p:sldId id="262" r:id="rId9"/>
+    <p:sldId id="264" r:id="rId10"/>
+    <p:sldId id="263" r:id="rId11"/>
+    <p:sldId id="271" r:id="rId12"/>
+    <p:sldId id="270" r:id="rId13"/>
   </p:sldIdLst>
   <p:sldSz cx="9144000" cy="6858000" type="screen4x3"/>
   <p:notesSz cx="6858000" cy="9144000"/>
@@ -119,7 +123,7 @@
   </p:defaultTextStyle>
   <p:extLst>
     <p:ext uri="{EFAFB233-063F-42B5-8137-9DF3F51BA10A}">
-      <p15:sldGuideLst xmlns:p15="http://schemas.microsoft.com/office/powerpoint/2012/main" xmlns="">
+      <p15:sldGuideLst xmlns:p15="http://schemas.microsoft.com/office/powerpoint/2012/main">
         <p15:guide id="1" orient="horz" pos="2160" userDrawn="1">
           <p15:clr>
             <a:srgbClr val="A4A3A4"/>
@@ -133,7 +137,7 @@
       </p15:sldGuideLst>
     </p:ext>
     <p:ext uri="{2D200454-40CA-4A62-9FC3-DE9A4176ACB9}">
-      <p15:notesGuideLst xmlns:p15="http://schemas.microsoft.com/office/powerpoint/2012/main" xmlns=""/>
+      <p15:notesGuideLst xmlns:p15="http://schemas.microsoft.com/office/powerpoint/2012/main"/>
     </p:ext>
   </p:extLst>
 </p:presentation>
@@ -221,7 +225,7 @@
           <a:p>
             <a:fld id="{1756009C-D4B5-45F2-881E-217A11902E90}" type="datetimeFigureOut">
               <a:rPr lang="nl-NL" smtClean="0"/>
-              <a:t>18-11-2016</a:t>
+              <a:t>31-5-2019</a:t>
             </a:fld>
             <a:endParaRPr lang="nl-NL"/>
           </a:p>
@@ -386,7 +390,7 @@
           <a:p>
             <a:fld id="{A85E6C62-5C66-47C1-A568-38F035DF616F}" type="datetimeFigureOut">
               <a:rPr lang="nl-NL" smtClean="0"/>
-              <a:t>18-11-2016</a:t>
+              <a:t>31-5-2019</a:t>
             </a:fld>
             <a:endParaRPr lang="nl-NL"/>
           </a:p>
@@ -654,90 +658,6 @@
 </p:notesMaster>
 </file>
 
-<file path=ppt/notesSlides/notesSlide1.xml><?xml version="1.0" encoding="utf-8"?>
-<p:notes xmlns:a="http://schemas.openxmlformats.org/drawingml/2006/main" xmlns:r="http://schemas.openxmlformats.org/officeDocument/2006/relationships" xmlns:p="http://schemas.openxmlformats.org/presentationml/2006/main">
-  <p:cSld>
-    <p:spTree>
-      <p:nvGrpSpPr>
-        <p:cNvPr id="1" name=""/>
-        <p:cNvGrpSpPr/>
-        <p:nvPr/>
-      </p:nvGrpSpPr>
-      <p:grpSpPr>
-        <a:xfrm>
-          <a:off x="0" y="0"/>
-          <a:ext cx="0" cy="0"/>
-          <a:chOff x="0" y="0"/>
-          <a:chExt cx="0" cy="0"/>
-        </a:xfrm>
-      </p:grpSpPr>
-      <p:sp>
-        <p:nvSpPr>
-          <p:cNvPr id="2" name="Slide Image Placeholder 1"/>
-          <p:cNvSpPr>
-            <a:spLocks noGrp="1" noRot="1" noChangeAspect="1"/>
-          </p:cNvSpPr>
-          <p:nvPr>
-            <p:ph type="sldImg"/>
-          </p:nvPr>
-        </p:nvSpPr>
-        <p:spPr/>
-      </p:sp>
-      <p:sp>
-        <p:nvSpPr>
-          <p:cNvPr id="3" name="Notes Placeholder 2"/>
-          <p:cNvSpPr>
-            <a:spLocks noGrp="1"/>
-          </p:cNvSpPr>
-          <p:nvPr>
-            <p:ph type="body" idx="1"/>
-          </p:nvPr>
-        </p:nvSpPr>
-        <p:spPr/>
-        <p:txBody>
-          <a:bodyPr/>
-          <a:lstStyle/>
-          <a:p>
-            <a:endParaRPr lang="nl-NL" dirty="0"/>
-          </a:p>
-        </p:txBody>
-      </p:sp>
-      <p:sp>
-        <p:nvSpPr>
-          <p:cNvPr id="4" name="Slide Number Placeholder 3"/>
-          <p:cNvSpPr>
-            <a:spLocks noGrp="1"/>
-          </p:cNvSpPr>
-          <p:nvPr>
-            <p:ph type="sldNum" sz="quarter" idx="10"/>
-          </p:nvPr>
-        </p:nvSpPr>
-        <p:spPr/>
-        <p:txBody>
-          <a:bodyPr/>
-          <a:lstStyle/>
-          <a:p>
-            <a:fld id="{08FE9610-C486-47F8-ADD6-619F7FD9D544}" type="slidenum">
-              <a:rPr lang="nl-NL" smtClean="0"/>
-              <a:t>2</a:t>
-            </a:fld>
-            <a:endParaRPr lang="nl-NL"/>
-          </a:p>
-        </p:txBody>
-      </p:sp>
-    </p:spTree>
-    <p:extLst>
-      <p:ext uri="{BB962C8B-B14F-4D97-AF65-F5344CB8AC3E}">
-        <p14:creationId xmlns:p14="http://schemas.microsoft.com/office/powerpoint/2010/main" val="7911580"/>
-      </p:ext>
-    </p:extLst>
-  </p:cSld>
-  <p:clrMapOvr>
-    <a:masterClrMapping/>
-  </p:clrMapOvr>
-</p:notes>
-</file>
-
 <file path=ppt/slideLayouts/slideLayout1.xml><?xml version="1.0" encoding="utf-8"?>
 <p:sldLayout xmlns:a="http://schemas.openxmlformats.org/drawingml/2006/main" xmlns:r="http://schemas.openxmlformats.org/officeDocument/2006/relationships" xmlns:p="http://schemas.openxmlformats.org/presentationml/2006/main" preserve="1" userDrawn="1">
   <p:cSld name="Title Slide">
@@ -900,71 +820,6 @@
           </a:p>
         </p:txBody>
       </p:sp>
-      <p:sp>
-        <p:nvSpPr>
-          <p:cNvPr id="4" name="Date Placeholder 3"/>
-          <p:cNvSpPr>
-            <a:spLocks noGrp="1"/>
-          </p:cNvSpPr>
-          <p:nvPr>
-            <p:ph type="dt" sz="half" idx="10"/>
-          </p:nvPr>
-        </p:nvSpPr>
-        <p:spPr/>
-        <p:txBody>
-          <a:bodyPr/>
-          <a:lstStyle/>
-          <a:p>
-            <a:fld id="{3985C516-3ECF-402D-A356-AC7CD21C75D5}" type="datetime1">
-              <a:rPr lang="en-US" smtClean="0"/>
-              <a:t>11/18/2016</a:t>
-            </a:fld>
-            <a:endParaRPr lang="en-US"/>
-          </a:p>
-        </p:txBody>
-      </p:sp>
-      <p:sp>
-        <p:nvSpPr>
-          <p:cNvPr id="5" name="Footer Placeholder 4"/>
-          <p:cNvSpPr>
-            <a:spLocks noGrp="1"/>
-          </p:cNvSpPr>
-          <p:nvPr>
-            <p:ph type="ftr" sz="quarter" idx="11"/>
-          </p:nvPr>
-        </p:nvSpPr>
-        <p:spPr/>
-        <p:txBody>
-          <a:bodyPr/>
-          <a:lstStyle/>
-          <a:p>
-            <a:endParaRPr lang="en-US" dirty="0"/>
-          </a:p>
-        </p:txBody>
-      </p:sp>
-      <p:sp>
-        <p:nvSpPr>
-          <p:cNvPr id="6" name="Slide Number Placeholder 5"/>
-          <p:cNvSpPr>
-            <a:spLocks noGrp="1"/>
-          </p:cNvSpPr>
-          <p:nvPr>
-            <p:ph type="sldNum" sz="quarter" idx="12"/>
-          </p:nvPr>
-        </p:nvSpPr>
-        <p:spPr/>
-        <p:txBody>
-          <a:bodyPr/>
-          <a:lstStyle/>
-          <a:p>
-            <a:fld id="{DC269568-8A00-4D6C-B5F9-4A08B7AF4045}" type="slidenum">
-              <a:rPr lang="en-US" smtClean="0"/>
-              <a:t>‹#›</a:t>
-            </a:fld>
-            <a:endParaRPr lang="en-US"/>
-          </a:p>
-        </p:txBody>
-      </p:sp>
     </p:spTree>
     <p:extLst>
       <p:ext uri="{BB962C8B-B14F-4D97-AF65-F5344CB8AC3E}">
@@ -1078,14 +933,22 @@
             <p:ph type="dt" sz="half" idx="10"/>
           </p:nvPr>
         </p:nvSpPr>
-        <p:spPr/>
+        <p:spPr>
+          <a:xfrm>
+            <a:off x="457200" y="6356352"/>
+            <a:ext cx="2133600" cy="365125"/>
+          </a:xfrm>
+          <a:prstGeom prst="rect">
+            <a:avLst/>
+          </a:prstGeom>
+        </p:spPr>
         <p:txBody>
           <a:bodyPr/>
           <a:lstStyle/>
           <a:p>
             <a:fld id="{D89702E1-EBD8-4AEF-A901-A53573EF6DA0}" type="datetime1">
               <a:rPr lang="en-US" smtClean="0"/>
-              <a:t>11/18/2016</a:t>
+              <a:t>5/31/2019</a:t>
             </a:fld>
             <a:endParaRPr lang="en-US"/>
           </a:p>
@@ -1101,7 +964,15 @@
             <p:ph type="ftr" sz="quarter" idx="11"/>
           </p:nvPr>
         </p:nvSpPr>
-        <p:spPr/>
+        <p:spPr>
+          <a:xfrm>
+            <a:off x="3124200" y="6356352"/>
+            <a:ext cx="2895600" cy="365125"/>
+          </a:xfrm>
+          <a:prstGeom prst="rect">
+            <a:avLst/>
+          </a:prstGeom>
+        </p:spPr>
         <p:txBody>
           <a:bodyPr/>
           <a:lstStyle/>
@@ -1120,7 +991,15 @@
             <p:ph type="sldNum" sz="quarter" idx="12"/>
           </p:nvPr>
         </p:nvSpPr>
-        <p:spPr/>
+        <p:spPr>
+          <a:xfrm>
+            <a:off x="6553200" y="6356352"/>
+            <a:ext cx="2133600" cy="365125"/>
+          </a:xfrm>
+          <a:prstGeom prst="rect">
+            <a:avLst/>
+          </a:prstGeom>
+        </p:spPr>
         <p:txBody>
           <a:bodyPr/>
           <a:lstStyle/>
@@ -1256,14 +1135,22 @@
             <p:ph type="dt" sz="half" idx="10"/>
           </p:nvPr>
         </p:nvSpPr>
-        <p:spPr/>
+        <p:spPr>
+          <a:xfrm>
+            <a:off x="457200" y="6356352"/>
+            <a:ext cx="2133600" cy="365125"/>
+          </a:xfrm>
+          <a:prstGeom prst="rect">
+            <a:avLst/>
+          </a:prstGeom>
+        </p:spPr>
         <p:txBody>
           <a:bodyPr/>
           <a:lstStyle/>
           <a:p>
             <a:fld id="{D23B4B29-DC3D-4EB7-B0FC-8330BA05E29E}" type="datetime1">
               <a:rPr lang="en-US" smtClean="0"/>
-              <a:t>11/18/2016</a:t>
+              <a:t>5/31/2019</a:t>
             </a:fld>
             <a:endParaRPr lang="en-US"/>
           </a:p>
@@ -1279,7 +1166,15 @@
             <p:ph type="ftr" sz="quarter" idx="11"/>
           </p:nvPr>
         </p:nvSpPr>
-        <p:spPr/>
+        <p:spPr>
+          <a:xfrm>
+            <a:off x="3124200" y="6356352"/>
+            <a:ext cx="2895600" cy="365125"/>
+          </a:xfrm>
+          <a:prstGeom prst="rect">
+            <a:avLst/>
+          </a:prstGeom>
+        </p:spPr>
         <p:txBody>
           <a:bodyPr/>
           <a:lstStyle/>
@@ -1298,7 +1193,15 @@
             <p:ph type="sldNum" sz="quarter" idx="12"/>
           </p:nvPr>
         </p:nvSpPr>
-        <p:spPr/>
+        <p:spPr>
+          <a:xfrm>
+            <a:off x="6553200" y="6356352"/>
+            <a:ext cx="2133600" cy="365125"/>
+          </a:xfrm>
+          <a:prstGeom prst="rect">
+            <a:avLst/>
+          </a:prstGeom>
+        </p:spPr>
         <p:txBody>
           <a:bodyPr/>
           <a:lstStyle/>
@@ -1411,71 +1314,6 @@
               <a:rPr lang="en-US"/>
               <a:t>Fifth level</a:t>
             </a:r>
-          </a:p>
-        </p:txBody>
-      </p:sp>
-      <p:sp>
-        <p:nvSpPr>
-          <p:cNvPr id="4" name="Date Placeholder 3"/>
-          <p:cNvSpPr>
-            <a:spLocks noGrp="1"/>
-          </p:cNvSpPr>
-          <p:nvPr>
-            <p:ph type="dt" sz="half" idx="10"/>
-          </p:nvPr>
-        </p:nvSpPr>
-        <p:spPr/>
-        <p:txBody>
-          <a:bodyPr/>
-          <a:lstStyle/>
-          <a:p>
-            <a:fld id="{5C99A52C-D0C9-44B6-9B9F-6EE1AC238DEC}" type="datetime1">
-              <a:rPr lang="en-US" smtClean="0"/>
-              <a:t>11/18/2016</a:t>
-            </a:fld>
-            <a:endParaRPr lang="en-US"/>
-          </a:p>
-        </p:txBody>
-      </p:sp>
-      <p:sp>
-        <p:nvSpPr>
-          <p:cNvPr id="5" name="Footer Placeholder 4"/>
-          <p:cNvSpPr>
-            <a:spLocks noGrp="1"/>
-          </p:cNvSpPr>
-          <p:nvPr>
-            <p:ph type="ftr" sz="quarter" idx="11"/>
-          </p:nvPr>
-        </p:nvSpPr>
-        <p:spPr/>
-        <p:txBody>
-          <a:bodyPr/>
-          <a:lstStyle/>
-          <a:p>
-            <a:endParaRPr lang="en-US"/>
-          </a:p>
-        </p:txBody>
-      </p:sp>
-      <p:sp>
-        <p:nvSpPr>
-          <p:cNvPr id="6" name="Slide Number Placeholder 5"/>
-          <p:cNvSpPr>
-            <a:spLocks noGrp="1"/>
-          </p:cNvSpPr>
-          <p:nvPr>
-            <p:ph type="sldNum" sz="quarter" idx="12"/>
-          </p:nvPr>
-        </p:nvSpPr>
-        <p:spPr/>
-        <p:txBody>
-          <a:bodyPr/>
-          <a:lstStyle/>
-          <a:p>
-            <a:fld id="{DC269568-8A00-4D6C-B5F9-4A08B7AF4045}" type="slidenum">
-              <a:rPr lang="en-US" smtClean="0"/>
-              <a:t>‹#›</a:t>
-            </a:fld>
-            <a:endParaRPr lang="en-US"/>
           </a:p>
         </p:txBody>
       </p:sp>
@@ -1659,71 +1497,6 @@
           </a:p>
         </p:txBody>
       </p:sp>
-      <p:sp>
-        <p:nvSpPr>
-          <p:cNvPr id="4" name="Date Placeholder 3"/>
-          <p:cNvSpPr>
-            <a:spLocks noGrp="1"/>
-          </p:cNvSpPr>
-          <p:nvPr>
-            <p:ph type="dt" sz="half" idx="10"/>
-          </p:nvPr>
-        </p:nvSpPr>
-        <p:spPr/>
-        <p:txBody>
-          <a:bodyPr/>
-          <a:lstStyle/>
-          <a:p>
-            <a:fld id="{96328658-7BF9-44BA-8501-52ADEFB31F99}" type="datetime1">
-              <a:rPr lang="en-US" smtClean="0"/>
-              <a:t>11/18/2016</a:t>
-            </a:fld>
-            <a:endParaRPr lang="en-US"/>
-          </a:p>
-        </p:txBody>
-      </p:sp>
-      <p:sp>
-        <p:nvSpPr>
-          <p:cNvPr id="5" name="Footer Placeholder 4"/>
-          <p:cNvSpPr>
-            <a:spLocks noGrp="1"/>
-          </p:cNvSpPr>
-          <p:nvPr>
-            <p:ph type="ftr" sz="quarter" idx="11"/>
-          </p:nvPr>
-        </p:nvSpPr>
-        <p:spPr/>
-        <p:txBody>
-          <a:bodyPr/>
-          <a:lstStyle/>
-          <a:p>
-            <a:endParaRPr lang="en-US"/>
-          </a:p>
-        </p:txBody>
-      </p:sp>
-      <p:sp>
-        <p:nvSpPr>
-          <p:cNvPr id="6" name="Slide Number Placeholder 5"/>
-          <p:cNvSpPr>
-            <a:spLocks noGrp="1"/>
-          </p:cNvSpPr>
-          <p:nvPr>
-            <p:ph type="sldNum" sz="quarter" idx="12"/>
-          </p:nvPr>
-        </p:nvSpPr>
-        <p:spPr/>
-        <p:txBody>
-          <a:bodyPr/>
-          <a:lstStyle/>
-          <a:p>
-            <a:fld id="{DC269568-8A00-4D6C-B5F9-4A08B7AF4045}" type="slidenum">
-              <a:rPr lang="en-US" smtClean="0"/>
-              <a:t>‹#›</a:t>
-            </a:fld>
-            <a:endParaRPr lang="en-US"/>
-          </a:p>
-        </p:txBody>
-      </p:sp>
     </p:spTree>
     <p:extLst>
       <p:ext uri="{BB962C8B-B14F-4D97-AF65-F5344CB8AC3E}">
@@ -1954,14 +1727,22 @@
             <p:ph type="dt" sz="half" idx="10"/>
           </p:nvPr>
         </p:nvSpPr>
-        <p:spPr/>
+        <p:spPr>
+          <a:xfrm>
+            <a:off x="457200" y="6356352"/>
+            <a:ext cx="2133600" cy="365125"/>
+          </a:xfrm>
+          <a:prstGeom prst="rect">
+            <a:avLst/>
+          </a:prstGeom>
+        </p:spPr>
         <p:txBody>
           <a:bodyPr/>
           <a:lstStyle/>
           <a:p>
             <a:fld id="{5E0F4F09-C7DA-45AD-BA83-F3FAD370D6C8}" type="datetime1">
               <a:rPr lang="en-US" smtClean="0"/>
-              <a:t>11/18/2016</a:t>
+              <a:t>5/31/2019</a:t>
             </a:fld>
             <a:endParaRPr lang="en-US"/>
           </a:p>
@@ -1977,7 +1758,15 @@
             <p:ph type="ftr" sz="quarter" idx="11"/>
           </p:nvPr>
         </p:nvSpPr>
-        <p:spPr/>
+        <p:spPr>
+          <a:xfrm>
+            <a:off x="3124200" y="6356352"/>
+            <a:ext cx="2895600" cy="365125"/>
+          </a:xfrm>
+          <a:prstGeom prst="rect">
+            <a:avLst/>
+          </a:prstGeom>
+        </p:spPr>
         <p:txBody>
           <a:bodyPr/>
           <a:lstStyle/>
@@ -1996,7 +1785,15 @@
             <p:ph type="sldNum" sz="quarter" idx="12"/>
           </p:nvPr>
         </p:nvSpPr>
-        <p:spPr/>
+        <p:spPr>
+          <a:xfrm>
+            <a:off x="6553200" y="6356352"/>
+            <a:ext cx="2133600" cy="365125"/>
+          </a:xfrm>
+          <a:prstGeom prst="rect">
+            <a:avLst/>
+          </a:prstGeom>
+        </p:spPr>
         <p:txBody>
           <a:bodyPr/>
           <a:lstStyle/>
@@ -2373,14 +2170,22 @@
             <p:ph type="dt" sz="half" idx="10"/>
           </p:nvPr>
         </p:nvSpPr>
-        <p:spPr/>
+        <p:spPr>
+          <a:xfrm>
+            <a:off x="457200" y="6356352"/>
+            <a:ext cx="2133600" cy="365125"/>
+          </a:xfrm>
+          <a:prstGeom prst="rect">
+            <a:avLst/>
+          </a:prstGeom>
+        </p:spPr>
         <p:txBody>
           <a:bodyPr/>
           <a:lstStyle/>
           <a:p>
             <a:fld id="{760A8F2A-3843-4AA5-8066-5CC4F35048E6}" type="datetime1">
               <a:rPr lang="en-US" smtClean="0"/>
-              <a:t>11/18/2016</a:t>
+              <a:t>5/31/2019</a:t>
             </a:fld>
             <a:endParaRPr lang="en-US"/>
           </a:p>
@@ -2396,7 +2201,15 @@
             <p:ph type="ftr" sz="quarter" idx="11"/>
           </p:nvPr>
         </p:nvSpPr>
-        <p:spPr/>
+        <p:spPr>
+          <a:xfrm>
+            <a:off x="3124200" y="6356352"/>
+            <a:ext cx="2895600" cy="365125"/>
+          </a:xfrm>
+          <a:prstGeom prst="rect">
+            <a:avLst/>
+          </a:prstGeom>
+        </p:spPr>
         <p:txBody>
           <a:bodyPr/>
           <a:lstStyle/>
@@ -2415,7 +2228,15 @@
             <p:ph type="sldNum" sz="quarter" idx="12"/>
           </p:nvPr>
         </p:nvSpPr>
-        <p:spPr/>
+        <p:spPr>
+          <a:xfrm>
+            <a:off x="6553200" y="6356352"/>
+            <a:ext cx="2133600" cy="365125"/>
+          </a:xfrm>
+          <a:prstGeom prst="rect">
+            <a:avLst/>
+          </a:prstGeom>
+        </p:spPr>
         <p:txBody>
           <a:bodyPr/>
           <a:lstStyle/>
@@ -2480,71 +2301,6 @@
           </a:p>
         </p:txBody>
       </p:sp>
-      <p:sp>
-        <p:nvSpPr>
-          <p:cNvPr id="3" name="Date Placeholder 2"/>
-          <p:cNvSpPr>
-            <a:spLocks noGrp="1"/>
-          </p:cNvSpPr>
-          <p:nvPr>
-            <p:ph type="dt" sz="half" idx="10"/>
-          </p:nvPr>
-        </p:nvSpPr>
-        <p:spPr/>
-        <p:txBody>
-          <a:bodyPr/>
-          <a:lstStyle/>
-          <a:p>
-            <a:fld id="{CD4855FB-E79B-4397-97B6-7057B83D9072}" type="datetime1">
-              <a:rPr lang="en-US" smtClean="0"/>
-              <a:t>11/18/2016</a:t>
-            </a:fld>
-            <a:endParaRPr lang="en-US"/>
-          </a:p>
-        </p:txBody>
-      </p:sp>
-      <p:sp>
-        <p:nvSpPr>
-          <p:cNvPr id="4" name="Footer Placeholder 3"/>
-          <p:cNvSpPr>
-            <a:spLocks noGrp="1"/>
-          </p:cNvSpPr>
-          <p:nvPr>
-            <p:ph type="ftr" sz="quarter" idx="11"/>
-          </p:nvPr>
-        </p:nvSpPr>
-        <p:spPr/>
-        <p:txBody>
-          <a:bodyPr/>
-          <a:lstStyle/>
-          <a:p>
-            <a:endParaRPr lang="en-US"/>
-          </a:p>
-        </p:txBody>
-      </p:sp>
-      <p:sp>
-        <p:nvSpPr>
-          <p:cNvPr id="5" name="Slide Number Placeholder 4"/>
-          <p:cNvSpPr>
-            <a:spLocks noGrp="1"/>
-          </p:cNvSpPr>
-          <p:nvPr>
-            <p:ph type="sldNum" sz="quarter" idx="12"/>
-          </p:nvPr>
-        </p:nvSpPr>
-        <p:spPr/>
-        <p:txBody>
-          <a:bodyPr/>
-          <a:lstStyle/>
-          <a:p>
-            <a:fld id="{DC269568-8A00-4D6C-B5F9-4A08B7AF4045}" type="slidenum">
-              <a:rPr lang="en-US" smtClean="0"/>
-              <a:t>‹#›</a:t>
-            </a:fld>
-            <a:endParaRPr lang="en-US"/>
-          </a:p>
-        </p:txBody>
-      </p:sp>
     </p:spTree>
     <p:extLst>
       <p:ext uri="{BB962C8B-B14F-4D97-AF65-F5344CB8AC3E}">
@@ -2575,71 +2331,6 @@
           <a:chExt cx="0" cy="0"/>
         </a:xfrm>
       </p:grpSpPr>
-      <p:sp>
-        <p:nvSpPr>
-          <p:cNvPr id="2" name="Date Placeholder 1"/>
-          <p:cNvSpPr>
-            <a:spLocks noGrp="1"/>
-          </p:cNvSpPr>
-          <p:nvPr>
-            <p:ph type="dt" sz="half" idx="10"/>
-          </p:nvPr>
-        </p:nvSpPr>
-        <p:spPr/>
-        <p:txBody>
-          <a:bodyPr/>
-          <a:lstStyle/>
-          <a:p>
-            <a:fld id="{9FD50504-F5C6-4D84-9B7B-98B92B4A5A1A}" type="datetime1">
-              <a:rPr lang="en-US" smtClean="0"/>
-              <a:t>11/18/2016</a:t>
-            </a:fld>
-            <a:endParaRPr lang="en-US"/>
-          </a:p>
-        </p:txBody>
-      </p:sp>
-      <p:sp>
-        <p:nvSpPr>
-          <p:cNvPr id="3" name="Footer Placeholder 2"/>
-          <p:cNvSpPr>
-            <a:spLocks noGrp="1"/>
-          </p:cNvSpPr>
-          <p:nvPr>
-            <p:ph type="ftr" sz="quarter" idx="11"/>
-          </p:nvPr>
-        </p:nvSpPr>
-        <p:spPr/>
-        <p:txBody>
-          <a:bodyPr/>
-          <a:lstStyle/>
-          <a:p>
-            <a:endParaRPr lang="en-US"/>
-          </a:p>
-        </p:txBody>
-      </p:sp>
-      <p:sp>
-        <p:nvSpPr>
-          <p:cNvPr id="4" name="Slide Number Placeholder 3"/>
-          <p:cNvSpPr>
-            <a:spLocks noGrp="1"/>
-          </p:cNvSpPr>
-          <p:nvPr>
-            <p:ph type="sldNum" sz="quarter" idx="12"/>
-          </p:nvPr>
-        </p:nvSpPr>
-        <p:spPr/>
-        <p:txBody>
-          <a:bodyPr/>
-          <a:lstStyle/>
-          <a:p>
-            <a:fld id="{DC269568-8A00-4D6C-B5F9-4A08B7AF4045}" type="slidenum">
-              <a:rPr lang="en-US" smtClean="0"/>
-              <a:t>‹#›</a:t>
-            </a:fld>
-            <a:endParaRPr lang="en-US"/>
-          </a:p>
-        </p:txBody>
-      </p:sp>
     </p:spTree>
     <p:extLst>
       <p:ext uri="{BB962C8B-B14F-4D97-AF65-F5344CB8AC3E}">
@@ -2860,14 +2551,22 @@
             <p:ph type="dt" sz="half" idx="10"/>
           </p:nvPr>
         </p:nvSpPr>
-        <p:spPr/>
+        <p:spPr>
+          <a:xfrm>
+            <a:off x="457200" y="6356352"/>
+            <a:ext cx="2133600" cy="365125"/>
+          </a:xfrm>
+          <a:prstGeom prst="rect">
+            <a:avLst/>
+          </a:prstGeom>
+        </p:spPr>
         <p:txBody>
           <a:bodyPr/>
           <a:lstStyle/>
           <a:p>
             <a:fld id="{0B7999F9-5C38-4179-9B82-8E05BB08BF85}" type="datetime1">
               <a:rPr lang="en-US" smtClean="0"/>
-              <a:t>11/18/2016</a:t>
+              <a:t>5/31/2019</a:t>
             </a:fld>
             <a:endParaRPr lang="en-US"/>
           </a:p>
@@ -2883,7 +2582,15 @@
             <p:ph type="ftr" sz="quarter" idx="11"/>
           </p:nvPr>
         </p:nvSpPr>
-        <p:spPr/>
+        <p:spPr>
+          <a:xfrm>
+            <a:off x="3124200" y="6356352"/>
+            <a:ext cx="2895600" cy="365125"/>
+          </a:xfrm>
+          <a:prstGeom prst="rect">
+            <a:avLst/>
+          </a:prstGeom>
+        </p:spPr>
         <p:txBody>
           <a:bodyPr/>
           <a:lstStyle/>
@@ -2902,7 +2609,15 @@
             <p:ph type="sldNum" sz="quarter" idx="12"/>
           </p:nvPr>
         </p:nvSpPr>
-        <p:spPr/>
+        <p:spPr>
+          <a:xfrm>
+            <a:off x="6553200" y="6356352"/>
+            <a:ext cx="2133600" cy="365125"/>
+          </a:xfrm>
+          <a:prstGeom prst="rect">
+            <a:avLst/>
+          </a:prstGeom>
+        </p:spPr>
         <p:txBody>
           <a:bodyPr/>
           <a:lstStyle/>
@@ -3112,14 +2827,22 @@
             <p:ph type="dt" sz="half" idx="10"/>
           </p:nvPr>
         </p:nvSpPr>
-        <p:spPr/>
+        <p:spPr>
+          <a:xfrm>
+            <a:off x="457200" y="6356352"/>
+            <a:ext cx="2133600" cy="365125"/>
+          </a:xfrm>
+          <a:prstGeom prst="rect">
+            <a:avLst/>
+          </a:prstGeom>
+        </p:spPr>
         <p:txBody>
           <a:bodyPr/>
           <a:lstStyle/>
           <a:p>
             <a:fld id="{72450F68-89D8-4EFC-86FB-9F2E92E03358}" type="datetime1">
               <a:rPr lang="en-US" smtClean="0"/>
-              <a:t>11/18/2016</a:t>
+              <a:t>5/31/2019</a:t>
             </a:fld>
             <a:endParaRPr lang="en-US"/>
           </a:p>
@@ -3135,7 +2858,15 @@
             <p:ph type="ftr" sz="quarter" idx="11"/>
           </p:nvPr>
         </p:nvSpPr>
-        <p:spPr/>
+        <p:spPr>
+          <a:xfrm>
+            <a:off x="3124200" y="6356352"/>
+            <a:ext cx="2895600" cy="365125"/>
+          </a:xfrm>
+          <a:prstGeom prst="rect">
+            <a:avLst/>
+          </a:prstGeom>
+        </p:spPr>
         <p:txBody>
           <a:bodyPr/>
           <a:lstStyle/>
@@ -3154,7 +2885,15 @@
             <p:ph type="sldNum" sz="quarter" idx="12"/>
           </p:nvPr>
         </p:nvSpPr>
-        <p:spPr/>
+        <p:spPr>
+          <a:xfrm>
+            <a:off x="6553200" y="6356352"/>
+            <a:ext cx="2133600" cy="365125"/>
+          </a:xfrm>
+          <a:prstGeom prst="rect">
+            <a:avLst/>
+          </a:prstGeom>
+        </p:spPr>
         <p:txBody>
           <a:bodyPr/>
           <a:lstStyle/>
@@ -3297,166 +3036,6 @@
       </p:sp>
       <p:sp>
         <p:nvSpPr>
-          <p:cNvPr id="4" name="Date Placeholder 3"/>
-          <p:cNvSpPr>
-            <a:spLocks noGrp="1"/>
-          </p:cNvSpPr>
-          <p:nvPr>
-            <p:ph type="dt" sz="half" idx="2"/>
-          </p:nvPr>
-        </p:nvSpPr>
-        <p:spPr>
-          <a:xfrm>
-            <a:off x="457200" y="6356352"/>
-            <a:ext cx="2133600" cy="365125"/>
-          </a:xfrm>
-          <a:prstGeom prst="rect">
-            <a:avLst/>
-          </a:prstGeom>
-        </p:spPr>
-        <p:txBody>
-          <a:bodyPr vert="horz" lIns="91440" tIns="45720" rIns="91440" bIns="45720" rtlCol="0" anchor="ctr"/>
-          <a:lstStyle>
-            <a:lvl1pPr algn="l">
-              <a:defRPr sz="900">
-                <a:solidFill>
-                  <a:schemeClr val="tx1">
-                    <a:tint val="75000"/>
-                  </a:schemeClr>
-                </a:solidFill>
-              </a:defRPr>
-            </a:lvl1pPr>
-          </a:lstStyle>
-          <a:p>
-            <a:fld id="{47BC10BD-8030-4276-8E7F-C43494ED8BBA}" type="datetime1">
-              <a:rPr lang="en-US" smtClean="0"/>
-              <a:t>11/18/2016</a:t>
-            </a:fld>
-            <a:endParaRPr lang="en-US"/>
-          </a:p>
-        </p:txBody>
-      </p:sp>
-      <p:sp>
-        <p:nvSpPr>
-          <p:cNvPr id="5" name="Footer Placeholder 4"/>
-          <p:cNvSpPr>
-            <a:spLocks noGrp="1"/>
-          </p:cNvSpPr>
-          <p:nvPr>
-            <p:ph type="ftr" sz="quarter" idx="3"/>
-          </p:nvPr>
-        </p:nvSpPr>
-        <p:spPr>
-          <a:xfrm>
-            <a:off x="3124200" y="6356352"/>
-            <a:ext cx="2895600" cy="365125"/>
-          </a:xfrm>
-          <a:prstGeom prst="rect">
-            <a:avLst/>
-          </a:prstGeom>
-        </p:spPr>
-        <p:txBody>
-          <a:bodyPr vert="horz" lIns="91440" tIns="45720" rIns="91440" bIns="45720" rtlCol="0" anchor="ctr"/>
-          <a:lstStyle>
-            <a:lvl1pPr algn="ctr">
-              <a:defRPr sz="900">
-                <a:solidFill>
-                  <a:schemeClr val="tx1">
-                    <a:tint val="75000"/>
-                  </a:schemeClr>
-                </a:solidFill>
-              </a:defRPr>
-            </a:lvl1pPr>
-          </a:lstStyle>
-          <a:p>
-            <a:endParaRPr lang="en-US" dirty="0"/>
-          </a:p>
-        </p:txBody>
-      </p:sp>
-      <p:sp>
-        <p:nvSpPr>
-          <p:cNvPr id="6" name="Slide Number Placeholder 5"/>
-          <p:cNvSpPr>
-            <a:spLocks noGrp="1"/>
-          </p:cNvSpPr>
-          <p:nvPr>
-            <p:ph type="sldNum" sz="quarter" idx="4"/>
-          </p:nvPr>
-        </p:nvSpPr>
-        <p:spPr>
-          <a:xfrm>
-            <a:off x="6553200" y="6356352"/>
-            <a:ext cx="2133600" cy="365125"/>
-          </a:xfrm>
-          <a:prstGeom prst="rect">
-            <a:avLst/>
-          </a:prstGeom>
-        </p:spPr>
-        <p:txBody>
-          <a:bodyPr vert="horz" lIns="91440" tIns="45720" rIns="91440" bIns="45720" rtlCol="0" anchor="ctr"/>
-          <a:lstStyle>
-            <a:lvl1pPr algn="r">
-              <a:defRPr sz="900">
-                <a:solidFill>
-                  <a:schemeClr val="tx1">
-                    <a:tint val="75000"/>
-                  </a:schemeClr>
-                </a:solidFill>
-              </a:defRPr>
-            </a:lvl1pPr>
-          </a:lstStyle>
-          <a:p>
-            <a:fld id="{DC269568-8A00-4D6C-B5F9-4A08B7AF4045}" type="slidenum">
-              <a:rPr lang="en-US" smtClean="0"/>
-              <a:t>‹#›</a:t>
-            </a:fld>
-            <a:endParaRPr lang="en-US" dirty="0"/>
-          </a:p>
-        </p:txBody>
-      </p:sp>
-      <p:pic>
-        <p:nvPicPr>
-          <p:cNvPr id="3074" name="Picture 2" descr="Home"/>
-          <p:cNvPicPr>
-            <a:picLocks noChangeAspect="1" noChangeArrowheads="1"/>
-          </p:cNvPicPr>
-          <p:nvPr userDrawn="1"/>
-        </p:nvPicPr>
-        <p:blipFill>
-          <a:blip r:embed="rId13">
-            <a:extLst>
-              <a:ext uri="{28A0092B-C50C-407E-A947-70E740481C1C}">
-                <a14:useLocalDpi xmlns:a14="http://schemas.microsoft.com/office/drawing/2010/main" val="0"/>
-              </a:ext>
-            </a:extLst>
-          </a:blip>
-          <a:srcRect/>
-          <a:stretch>
-            <a:fillRect/>
-          </a:stretch>
-        </p:blipFill>
-        <p:spPr bwMode="auto">
-          <a:xfrm>
-            <a:off x="457200" y="6343649"/>
-            <a:ext cx="1714500" cy="390526"/>
-          </a:xfrm>
-          <a:prstGeom prst="rect">
-            <a:avLst/>
-          </a:prstGeom>
-          <a:noFill/>
-          <a:extLst>
-            <a:ext uri="{909E8E84-426E-40DD-AFC4-6F175D3DCCD1}">
-              <a14:hiddenFill xmlns:a14="http://schemas.microsoft.com/office/drawing/2010/main">
-                <a:solidFill>
-                  <a:srgbClr val="FFFFFF"/>
-                </a:solidFill>
-              </a14:hiddenFill>
-            </a:ext>
-          </a:extLst>
-        </p:spPr>
-      </p:pic>
-      <p:sp>
-        <p:nvSpPr>
           <p:cNvPr id="8" name="TextBox 7"/>
           <p:cNvSpPr txBox="1"/>
           <p:nvPr userDrawn="1"/>
@@ -3491,6 +3070,42 @@
           </a:p>
         </p:txBody>
       </p:sp>
+      <p:pic>
+        <p:nvPicPr>
+          <p:cNvPr id="9" name="Picture 8" descr="Trailblazers logo">
+            <a:extLst>
+              <a:ext uri="{FF2B5EF4-FFF2-40B4-BE49-F238E27FC236}">
+                <a16:creationId xmlns:a16="http://schemas.microsoft.com/office/drawing/2014/main" id="{52B30EB0-F5A2-4C36-9D2B-F7F6B91C4E7E}"/>
+              </a:ext>
+            </a:extLst>
+          </p:cNvPr>
+          <p:cNvPicPr>
+            <a:picLocks noChangeAspect="1"/>
+          </p:cNvPicPr>
+          <p:nvPr userDrawn="1"/>
+        </p:nvPicPr>
+        <p:blipFill>
+          <a:blip r:embed="rId13" cstate="print">
+            <a:extLst>
+              <a:ext uri="{28A0092B-C50C-407E-A947-70E740481C1C}">
+                <a14:useLocalDpi xmlns:a14="http://schemas.microsoft.com/office/drawing/2010/main" val="0"/>
+              </a:ext>
+            </a:extLst>
+          </a:blip>
+          <a:stretch>
+            <a:fillRect/>
+          </a:stretch>
+        </p:blipFill>
+        <p:spPr>
+          <a:xfrm>
+            <a:off x="457200" y="6223395"/>
+            <a:ext cx="2073600" cy="540000"/>
+          </a:xfrm>
+          <a:prstGeom prst="rect">
+            <a:avLst/>
+          </a:prstGeom>
+        </p:spPr>
+      </p:pic>
     </p:spTree>
     <p:extLst>
       <p:ext uri="{BB962C8B-B14F-4D97-AF65-F5344CB8AC3E}">
@@ -3817,25 +3432,46 @@
         </p:nvSpPr>
         <p:spPr/>
         <p:txBody>
-          <a:bodyPr/>
+          <a:bodyPr>
+            <a:normAutofit fontScale="92500" lnSpcReduction="10000"/>
+          </a:bodyPr>
           <a:lstStyle/>
           <a:p>
             <a:r>
               <a:rPr lang="en-US" dirty="0"/>
-              <a:t>Régina ten Bruggencate </a:t>
-            </a:r>
-          </a:p>
-          <a:p>
-            <a:r>
-              <a:rPr lang="en-US" dirty="0"/>
-              <a:t>Linda van der Pal </a:t>
-            </a:r>
-          </a:p>
-          <a:p>
-            <a:r>
-              <a:rPr lang="en-US" dirty="0"/>
-              <a:t>Finalist</a:t>
-            </a:r>
+              <a:t>Joanne </a:t>
+            </a:r>
+            <a:r>
+              <a:rPr lang="en-US" dirty="0" err="1"/>
+              <a:t>Boerstoel</a:t>
+            </a:r>
+            <a:endParaRPr lang="en-US" dirty="0"/>
+          </a:p>
+          <a:p>
+            <a:r>
+              <a:rPr lang="en-US" dirty="0" err="1"/>
+              <a:t>Régina</a:t>
+            </a:r>
+            <a:r>
+              <a:rPr lang="en-US" dirty="0"/>
+              <a:t> ten Bruggencate </a:t>
+            </a:r>
+          </a:p>
+          <a:p>
+            <a:r>
+              <a:rPr lang="en-US" dirty="0"/>
+              <a:t>Linda van der Pal</a:t>
+            </a:r>
+          </a:p>
+          <a:p>
+            <a:endParaRPr lang="en-US" sz="1100" dirty="0"/>
+          </a:p>
+          <a:p>
+            <a:r>
+              <a:rPr lang="en-US" dirty="0" err="1"/>
+              <a:t>TrailBlazers</a:t>
+            </a:r>
+            <a:endParaRPr lang="en-US" dirty="0"/>
           </a:p>
         </p:txBody>
       </p:sp>
@@ -3849,13 +3485,476 @@
   <p:clrMapOvr>
     <a:masterClrMapping/>
   </p:clrMapOvr>
-  <p:timing>
-    <p:tnLst>
-      <p:par>
-        <p:cTn id="1" dur="indefinite" restart="never" nodeType="tmRoot"/>
-      </p:par>
-    </p:tnLst>
-  </p:timing>
+</p:sld>
+</file>
+
+<file path=ppt/slides/slide10.xml><?xml version="1.0" encoding="utf-8"?>
+<p:sld xmlns:a="http://schemas.openxmlformats.org/drawingml/2006/main" xmlns:r="http://schemas.openxmlformats.org/officeDocument/2006/relationships" xmlns:p="http://schemas.openxmlformats.org/presentationml/2006/main">
+  <p:cSld>
+    <p:spTree>
+      <p:nvGrpSpPr>
+        <p:cNvPr id="1" name=""/>
+        <p:cNvGrpSpPr/>
+        <p:nvPr/>
+      </p:nvGrpSpPr>
+      <p:grpSpPr>
+        <a:xfrm>
+          <a:off x="0" y="0"/>
+          <a:ext cx="0" cy="0"/>
+          <a:chOff x="0" y="0"/>
+          <a:chExt cx="0" cy="0"/>
+        </a:xfrm>
+      </p:grpSpPr>
+      <p:sp>
+        <p:nvSpPr>
+          <p:cNvPr id="2" name="Title 1"/>
+          <p:cNvSpPr>
+            <a:spLocks noGrp="1"/>
+          </p:cNvSpPr>
+          <p:nvPr>
+            <p:ph type="title"/>
+          </p:nvPr>
+        </p:nvSpPr>
+        <p:spPr/>
+        <p:txBody>
+          <a:bodyPr/>
+          <a:lstStyle/>
+          <a:p>
+            <a:r>
+              <a:rPr lang="nl-NL" dirty="0"/>
+              <a:t>Set Rules</a:t>
+            </a:r>
+          </a:p>
+        </p:txBody>
+      </p:sp>
+      <p:sp>
+        <p:nvSpPr>
+          <p:cNvPr id="3" name="Content Placeholder 2"/>
+          <p:cNvSpPr>
+            <a:spLocks noGrp="1"/>
+          </p:cNvSpPr>
+          <p:nvPr>
+            <p:ph idx="1"/>
+          </p:nvPr>
+        </p:nvSpPr>
+        <p:spPr/>
+        <p:txBody>
+          <a:bodyPr>
+            <a:normAutofit lnSpcReduction="10000"/>
+          </a:bodyPr>
+          <a:lstStyle/>
+          <a:p>
+            <a:r>
+              <a:rPr lang="nl-NL" dirty="0"/>
+              <a:t>Each card has four properties</a:t>
+            </a:r>
+          </a:p>
+          <a:p>
+            <a:pPr lvl="1"/>
+            <a:r>
+              <a:rPr lang="nl-NL" dirty="0"/>
+              <a:t>Quantity: 1, 2 or 3</a:t>
+            </a:r>
+          </a:p>
+          <a:p>
+            <a:pPr lvl="1"/>
+            <a:r>
+              <a:rPr lang="nl-NL" dirty="0"/>
+              <a:t>Colour: red, blue or green</a:t>
+            </a:r>
+          </a:p>
+          <a:p>
+            <a:pPr lvl="1"/>
+            <a:r>
+              <a:rPr lang="nl-NL" dirty="0"/>
+              <a:t>Shape: heart, ellipse or square</a:t>
+            </a:r>
+          </a:p>
+          <a:p>
+            <a:pPr lvl="1"/>
+            <a:r>
+              <a:rPr lang="nl-NL" dirty="0"/>
+              <a:t>Filling: open, shaded, full</a:t>
+            </a:r>
+          </a:p>
+          <a:p>
+            <a:r>
+              <a:rPr lang="nl-NL" dirty="0"/>
+              <a:t>12 card form a board</a:t>
+            </a:r>
+          </a:p>
+          <a:p>
+            <a:r>
+              <a:rPr lang="nl-NL" dirty="0"/>
+              <a:t>3 cards form a set, if any given property</a:t>
+            </a:r>
+          </a:p>
+          <a:p>
+            <a:pPr lvl="1"/>
+            <a:r>
+              <a:rPr lang="nl-NL" dirty="0"/>
+              <a:t>Is equal for all three cards (3x red)</a:t>
+            </a:r>
+          </a:p>
+          <a:p>
+            <a:pPr lvl="1"/>
+            <a:r>
+              <a:rPr lang="nl-NL" dirty="0"/>
+              <a:t>Is unequal for all three cards (red, blue and green)</a:t>
+            </a:r>
+          </a:p>
+          <a:p>
+            <a:r>
+              <a:rPr lang="nl-NL" dirty="0"/>
+              <a:t>If no set can be found, 3 extra cards are added</a:t>
+            </a:r>
+          </a:p>
+          <a:p>
+            <a:r>
+              <a:rPr lang="nl-NL" dirty="0"/>
+              <a:t>The game is over when all cards are drawn and no </a:t>
+            </a:r>
+            <a:r>
+              <a:rPr lang="nl-NL"/>
+              <a:t>more sets can be found</a:t>
+            </a:r>
+            <a:endParaRPr lang="nl-NL" dirty="0"/>
+          </a:p>
+          <a:p>
+            <a:endParaRPr lang="nl-NL" dirty="0"/>
+          </a:p>
+        </p:txBody>
+      </p:sp>
+    </p:spTree>
+    <p:extLst>
+      <p:ext uri="{BB962C8B-B14F-4D97-AF65-F5344CB8AC3E}">
+        <p14:creationId xmlns:p14="http://schemas.microsoft.com/office/powerpoint/2010/main" val="1757863826"/>
+      </p:ext>
+    </p:extLst>
+  </p:cSld>
+  <p:clrMapOvr>
+    <a:masterClrMapping/>
+  </p:clrMapOvr>
+</p:sld>
+</file>
+
+<file path=ppt/slides/slide11.xml><?xml version="1.0" encoding="utf-8"?>
+<p:sld xmlns:a="http://schemas.openxmlformats.org/drawingml/2006/main" xmlns:r="http://schemas.openxmlformats.org/officeDocument/2006/relationships" xmlns:p="http://schemas.openxmlformats.org/presentationml/2006/main">
+  <p:cSld>
+    <p:spTree>
+      <p:nvGrpSpPr>
+        <p:cNvPr id="1" name=""/>
+        <p:cNvGrpSpPr/>
+        <p:nvPr/>
+      </p:nvGrpSpPr>
+      <p:grpSpPr>
+        <a:xfrm>
+          <a:off x="0" y="0"/>
+          <a:ext cx="0" cy="0"/>
+          <a:chOff x="0" y="0"/>
+          <a:chExt cx="0" cy="0"/>
+        </a:xfrm>
+      </p:grpSpPr>
+      <p:sp>
+        <p:nvSpPr>
+          <p:cNvPr id="2" name="Title 1">
+            <a:extLst>
+              <a:ext uri="{FF2B5EF4-FFF2-40B4-BE49-F238E27FC236}">
+                <a16:creationId xmlns:a16="http://schemas.microsoft.com/office/drawing/2014/main" id="{E36516CE-E7CC-4293-8F22-A637BD00828B}"/>
+              </a:ext>
+            </a:extLst>
+          </p:cNvPr>
+          <p:cNvSpPr>
+            <a:spLocks noGrp="1"/>
+          </p:cNvSpPr>
+          <p:nvPr>
+            <p:ph type="title"/>
+          </p:nvPr>
+        </p:nvSpPr>
+        <p:spPr/>
+        <p:txBody>
+          <a:bodyPr/>
+          <a:lstStyle/>
+          <a:p>
+            <a:r>
+              <a:rPr lang="en-US" dirty="0"/>
+              <a:t>Contact info</a:t>
+            </a:r>
+            <a:endParaRPr lang="en-NL" dirty="0"/>
+          </a:p>
+        </p:txBody>
+      </p:sp>
+      <p:sp>
+        <p:nvSpPr>
+          <p:cNvPr id="3" name="Content Placeholder 2">
+            <a:extLst>
+              <a:ext uri="{FF2B5EF4-FFF2-40B4-BE49-F238E27FC236}">
+                <a16:creationId xmlns:a16="http://schemas.microsoft.com/office/drawing/2014/main" id="{2C061AD1-A6F8-4101-B14A-A62CCED80C28}"/>
+              </a:ext>
+            </a:extLst>
+          </p:cNvPr>
+          <p:cNvSpPr>
+            <a:spLocks noGrp="1"/>
+          </p:cNvSpPr>
+          <p:nvPr>
+            <p:ph idx="1"/>
+          </p:nvPr>
+        </p:nvSpPr>
+        <p:spPr/>
+        <p:txBody>
+          <a:bodyPr/>
+          <a:lstStyle/>
+          <a:p>
+            <a:r>
+              <a:rPr lang="en-US" dirty="0"/>
+              <a:t>Linda van der Pal</a:t>
+            </a:r>
+          </a:p>
+          <a:p>
+            <a:pPr lvl="1"/>
+            <a:r>
+              <a:rPr lang="en-US" dirty="0">
+                <a:hlinkClick r:id="rId2"/>
+              </a:rPr>
+              <a:t>linda@trailblazers.nl</a:t>
+            </a:r>
+            <a:endParaRPr lang="en-US" dirty="0"/>
+          </a:p>
+          <a:p>
+            <a:pPr lvl="1"/>
+            <a:r>
+              <a:rPr lang="en-US" dirty="0"/>
+              <a:t>@</a:t>
+            </a:r>
+            <a:r>
+              <a:rPr lang="en-US" dirty="0" err="1"/>
+              <a:t>DuchessFounder</a:t>
+            </a:r>
+            <a:endParaRPr lang="en-US" dirty="0"/>
+          </a:p>
+          <a:p>
+            <a:r>
+              <a:rPr lang="en-US" dirty="0" err="1"/>
+              <a:t>Régina</a:t>
+            </a:r>
+            <a:r>
+              <a:rPr lang="en-US" dirty="0"/>
+              <a:t> ten </a:t>
+            </a:r>
+            <a:r>
+              <a:rPr lang="en-US" dirty="0" err="1"/>
+              <a:t>Bruggencate</a:t>
+            </a:r>
+            <a:endParaRPr lang="en-US" dirty="0"/>
+          </a:p>
+          <a:p>
+            <a:pPr lvl="1"/>
+            <a:r>
+              <a:rPr lang="en-US" dirty="0">
+                <a:hlinkClick r:id="rId3"/>
+              </a:rPr>
+              <a:t>regina@trailblazers.nl</a:t>
+            </a:r>
+            <a:endParaRPr lang="en-US" dirty="0"/>
+          </a:p>
+          <a:p>
+            <a:pPr lvl="1"/>
+            <a:r>
+              <a:rPr lang="en-US" dirty="0"/>
+              <a:t>@reginatb38</a:t>
+            </a:r>
+          </a:p>
+          <a:p>
+            <a:r>
+              <a:rPr lang="en-US" dirty="0"/>
+              <a:t>Joanne </a:t>
+            </a:r>
+            <a:r>
+              <a:rPr lang="en-US" dirty="0" err="1"/>
+              <a:t>Boerstoel</a:t>
+            </a:r>
+            <a:endParaRPr lang="en-US" dirty="0"/>
+          </a:p>
+          <a:p>
+            <a:pPr lvl="1"/>
+            <a:r>
+              <a:rPr lang="en-US" dirty="0">
+                <a:hlinkClick r:id="rId4"/>
+              </a:rPr>
+              <a:t>joanne@trailblazers.nl</a:t>
+            </a:r>
+            <a:endParaRPr lang="en-US" dirty="0"/>
+          </a:p>
+          <a:p>
+            <a:pPr lvl="1"/>
+            <a:endParaRPr lang="en-US" dirty="0"/>
+          </a:p>
+        </p:txBody>
+      </p:sp>
+    </p:spTree>
+    <p:extLst>
+      <p:ext uri="{BB962C8B-B14F-4D97-AF65-F5344CB8AC3E}">
+        <p14:creationId xmlns:p14="http://schemas.microsoft.com/office/powerpoint/2010/main" val="460946427"/>
+      </p:ext>
+    </p:extLst>
+  </p:cSld>
+  <p:clrMapOvr>
+    <a:masterClrMapping/>
+  </p:clrMapOvr>
+</p:sld>
+</file>
+
+<file path=ppt/slides/slide12.xml><?xml version="1.0" encoding="utf-8"?>
+<p:sld xmlns:a="http://schemas.openxmlformats.org/drawingml/2006/main" xmlns:r="http://schemas.openxmlformats.org/officeDocument/2006/relationships" xmlns:p="http://schemas.openxmlformats.org/presentationml/2006/main">
+  <p:cSld>
+    <p:spTree>
+      <p:nvGrpSpPr>
+        <p:cNvPr id="1" name=""/>
+        <p:cNvGrpSpPr/>
+        <p:nvPr/>
+      </p:nvGrpSpPr>
+      <p:grpSpPr>
+        <a:xfrm>
+          <a:off x="0" y="0"/>
+          <a:ext cx="0" cy="0"/>
+          <a:chOff x="0" y="0"/>
+          <a:chExt cx="0" cy="0"/>
+        </a:xfrm>
+      </p:grpSpPr>
+      <p:sp>
+        <p:nvSpPr>
+          <p:cNvPr id="2" name="Title 1">
+            <a:extLst>
+              <a:ext uri="{FF2B5EF4-FFF2-40B4-BE49-F238E27FC236}">
+                <a16:creationId xmlns:a16="http://schemas.microsoft.com/office/drawing/2014/main" id="{441EF060-9103-4D13-9E9D-2002BCCC9128}"/>
+              </a:ext>
+            </a:extLst>
+          </p:cNvPr>
+          <p:cNvSpPr>
+            <a:spLocks noGrp="1"/>
+          </p:cNvSpPr>
+          <p:nvPr>
+            <p:ph type="title"/>
+          </p:nvPr>
+        </p:nvSpPr>
+        <p:spPr/>
+        <p:txBody>
+          <a:bodyPr/>
+          <a:lstStyle/>
+          <a:p>
+            <a:r>
+              <a:rPr lang="en-US" dirty="0" err="1"/>
+              <a:t>Github</a:t>
+            </a:r>
+            <a:r>
+              <a:rPr lang="en-US" dirty="0"/>
+              <a:t> repos for the workshop</a:t>
+            </a:r>
+            <a:endParaRPr lang="en-NL" dirty="0"/>
+          </a:p>
+        </p:txBody>
+      </p:sp>
+      <p:sp>
+        <p:nvSpPr>
+          <p:cNvPr id="3" name="Content Placeholder 2">
+            <a:extLst>
+              <a:ext uri="{FF2B5EF4-FFF2-40B4-BE49-F238E27FC236}">
+                <a16:creationId xmlns:a16="http://schemas.microsoft.com/office/drawing/2014/main" id="{D985F415-FA77-4D50-8E23-69474D01989F}"/>
+              </a:ext>
+            </a:extLst>
+          </p:cNvPr>
+          <p:cNvSpPr>
+            <a:spLocks noGrp="1"/>
+          </p:cNvSpPr>
+          <p:nvPr>
+            <p:ph idx="1"/>
+          </p:nvPr>
+        </p:nvSpPr>
+        <p:spPr/>
+        <p:txBody>
+          <a:bodyPr/>
+          <a:lstStyle/>
+          <a:p>
+            <a:r>
+              <a:rPr lang="en-US" dirty="0">
+                <a:hlinkClick r:id="rId2">
+                  <a:extLst>
+                    <a:ext uri="{A12FA001-AC4F-418D-AE19-62706E023703}">
+                      <ahyp:hlinkClr xmlns:ahyp="http://schemas.microsoft.com/office/drawing/2018/hyperlinkcolor" val="tx"/>
+                    </a:ext>
+                  </a:extLst>
+                </a:hlinkClick>
+              </a:rPr>
+              <a:t>Repos for the workshop teams:</a:t>
+            </a:r>
+            <a:endParaRPr lang="en-US" dirty="0">
+              <a:hlinkClick r:id="rId2"/>
+            </a:endParaRPr>
+          </a:p>
+          <a:p>
+            <a:pPr lvl="1"/>
+            <a:r>
+              <a:rPr lang="en-US" dirty="0">
+                <a:hlinkClick r:id="rId2"/>
+              </a:rPr>
+              <a:t>https://github.com/lvdpal/JBCN-TeamA</a:t>
+            </a:r>
+            <a:endParaRPr lang="en-US" dirty="0"/>
+          </a:p>
+          <a:p>
+            <a:pPr lvl="1"/>
+            <a:r>
+              <a:rPr lang="en-US" dirty="0">
+                <a:hlinkClick r:id="rId3"/>
+              </a:rPr>
+              <a:t>https://github.com/lvdpal/JBCN-TeamB</a:t>
+            </a:r>
+            <a:endParaRPr lang="en-US" dirty="0"/>
+          </a:p>
+          <a:p>
+            <a:pPr lvl="1"/>
+            <a:r>
+              <a:rPr lang="en-US" dirty="0">
+                <a:hlinkClick r:id="rId4"/>
+              </a:rPr>
+              <a:t>https://github.com/lvdpal/JBCN-TeamC</a:t>
+            </a:r>
+            <a:endParaRPr lang="en-US" dirty="0"/>
+          </a:p>
+          <a:p>
+            <a:r>
+              <a:rPr lang="en-US" dirty="0"/>
+              <a:t>Running example made by us:</a:t>
+            </a:r>
+          </a:p>
+          <a:p>
+            <a:pPr lvl="1"/>
+            <a:r>
+              <a:rPr lang="en-US" dirty="0">
+                <a:hlinkClick r:id="rId5"/>
+              </a:rPr>
+              <a:t>https://github.com/lvdpal/microservices</a:t>
+            </a:r>
+            <a:endParaRPr lang="en-US" dirty="0"/>
+          </a:p>
+          <a:p>
+            <a:endParaRPr lang="en-US" dirty="0"/>
+          </a:p>
+          <a:p>
+            <a:endParaRPr lang="en-NL" dirty="0"/>
+          </a:p>
+        </p:txBody>
+      </p:sp>
+    </p:spTree>
+    <p:extLst>
+      <p:ext uri="{BB962C8B-B14F-4D97-AF65-F5344CB8AC3E}">
+        <p14:creationId xmlns:p14="http://schemas.microsoft.com/office/powerpoint/2010/main" val="2418719916"/>
+      </p:ext>
+    </p:extLst>
+  </p:cSld>
+  <p:clrMapOvr>
+    <a:masterClrMapping/>
+  </p:clrMapOvr>
 </p:sld>
 </file>
 
@@ -3878,115 +3977,138 @@
       </p:grpSpPr>
       <p:sp>
         <p:nvSpPr>
-          <p:cNvPr id="2" name="Title 1"/>
-          <p:cNvSpPr>
-            <a:spLocks noGrp="1"/>
-          </p:cNvSpPr>
-          <p:nvPr>
-            <p:ph type="ctrTitle"/>
+          <p:cNvPr id="2" name="Title 1">
+            <a:extLst>
+              <a:ext uri="{FF2B5EF4-FFF2-40B4-BE49-F238E27FC236}">
+                <a16:creationId xmlns:a16="http://schemas.microsoft.com/office/drawing/2014/main" id="{1636CE53-567F-47FC-A707-4488C5C83375}"/>
+              </a:ext>
+            </a:extLst>
+          </p:cNvPr>
+          <p:cNvSpPr>
+            <a:spLocks noGrp="1"/>
+          </p:cNvSpPr>
+          <p:nvPr>
+            <p:ph type="title"/>
           </p:nvPr>
         </p:nvSpPr>
         <p:spPr/>
         <p:txBody>
-          <a:bodyPr>
-            <a:normAutofit/>
-          </a:bodyPr>
+          <a:bodyPr/>
           <a:lstStyle/>
           <a:p>
             <a:r>
               <a:rPr lang="en-US" dirty="0"/>
-              <a:t>Inspired by </a:t>
-            </a:r>
-            <a:br>
-              <a:rPr lang="en-US" dirty="0"/>
-            </a:br>
-            <a:r>
-              <a:rPr lang="en-US" dirty="0"/>
-              <a:t>Erik </a:t>
-            </a:r>
+              <a:t>Who are we?</a:t>
+            </a:r>
+            <a:endParaRPr lang="en-NL" dirty="0"/>
+          </a:p>
+        </p:txBody>
+      </p:sp>
+      <p:sp>
+        <p:nvSpPr>
+          <p:cNvPr id="3" name="Content Placeholder 2">
+            <a:extLst>
+              <a:ext uri="{FF2B5EF4-FFF2-40B4-BE49-F238E27FC236}">
+                <a16:creationId xmlns:a16="http://schemas.microsoft.com/office/drawing/2014/main" id="{86CA2DA7-3D9F-44E7-9DDA-C1521CD4BEDD}"/>
+              </a:ext>
+            </a:extLst>
+          </p:cNvPr>
+          <p:cNvSpPr>
+            <a:spLocks noGrp="1"/>
+          </p:cNvSpPr>
+          <p:nvPr>
+            <p:ph idx="1"/>
+          </p:nvPr>
+        </p:nvSpPr>
+        <p:spPr/>
+        <p:txBody>
+          <a:bodyPr/>
+          <a:lstStyle/>
+          <a:p>
+            <a:r>
+              <a:rPr lang="en-US" dirty="0"/>
+              <a:t>Linda van der Pal</a:t>
+            </a:r>
+          </a:p>
+          <a:p>
+            <a:pPr lvl="1"/>
+            <a:r>
+              <a:rPr lang="en-US" dirty="0"/>
+              <a:t>Java Developer (17 years)</a:t>
+            </a:r>
+          </a:p>
+          <a:p>
+            <a:pPr lvl="1"/>
+            <a:r>
+              <a:rPr lang="en-US" dirty="0"/>
+              <a:t>Java Champion (2013)</a:t>
+            </a:r>
+          </a:p>
+          <a:p>
+            <a:pPr lvl="1"/>
+            <a:r>
+              <a:rPr lang="en-US" dirty="0"/>
+              <a:t>Founder of Duchess (2008)</a:t>
+            </a:r>
+          </a:p>
+          <a:p>
+            <a:pPr lvl="1"/>
             <a:r>
               <a:rPr lang="en-US" dirty="0" err="1"/>
-              <a:t>Talboom</a:t>
-            </a:r>
-            <a:r>
-              <a:rPr lang="en-US" dirty="0"/>
-              <a:t> &amp; Koen </a:t>
-            </a:r>
+              <a:t>Agilist</a:t>
+            </a:r>
+            <a:endParaRPr lang="en-US" dirty="0"/>
+          </a:p>
+          <a:p>
+            <a:pPr lvl="1"/>
             <a:r>
               <a:rPr lang="en-US" dirty="0" err="1"/>
-              <a:t>Metsu</a:t>
-            </a:r>
-            <a:endParaRPr lang="en-US" dirty="0"/>
-          </a:p>
-        </p:txBody>
-      </p:sp>
-      <p:sp>
-        <p:nvSpPr>
-          <p:cNvPr id="3" name="Content Placeholder 2"/>
-          <p:cNvSpPr>
-            <a:spLocks noGrp="1"/>
-          </p:cNvSpPr>
-          <p:nvPr>
-            <p:ph type="subTitle" idx="1"/>
-          </p:nvPr>
-        </p:nvSpPr>
-        <p:spPr/>
-        <p:txBody>
-          <a:bodyPr>
-            <a:normAutofit fontScale="85000" lnSpcReduction="10000"/>
-          </a:bodyPr>
-          <a:lstStyle/>
-          <a:p>
-            <a:pPr marL="0" indent="0" algn="ctr">
-              <a:buNone/>
-            </a:pPr>
-            <a:r>
-              <a:rPr lang="en-US" sz="3200" dirty="0"/>
-              <a:t>Splitting up a problem into microservices </a:t>
-            </a:r>
-          </a:p>
-          <a:p>
-            <a:pPr marL="0" indent="0" algn="ctr">
-              <a:buNone/>
-            </a:pPr>
-            <a:endParaRPr lang="en-US" sz="3200" dirty="0"/>
-          </a:p>
-          <a:p>
-            <a:pPr marL="0" indent="0" algn="ctr">
-              <a:buNone/>
-            </a:pPr>
-            <a:r>
-              <a:rPr lang="en-US" dirty="0"/>
-              <a:t>A nice cocktail of hardcore OO design mixed with some microservices, </a:t>
+              <a:t>Rolemodel</a:t>
+            </a:r>
+            <a:r>
+              <a:rPr lang="en-US" dirty="0"/>
+              <a:t> (VHTO, </a:t>
             </a:r>
             <a:r>
               <a:rPr lang="en-US" dirty="0" err="1"/>
-              <a:t>flavoured</a:t>
-            </a:r>
-            <a:r>
-              <a:rPr lang="en-US" dirty="0"/>
-              <a:t> with single responsibility </a:t>
-            </a:r>
+              <a:t>FutureNL</a:t>
+            </a:r>
+            <a:r>
+              <a:rPr lang="en-US" dirty="0"/>
+              <a:t>, Devoxx4Kids, </a:t>
+            </a:r>
+            <a:r>
+              <a:rPr lang="en-US" dirty="0" err="1"/>
+              <a:t>JFall</a:t>
+            </a:r>
+            <a:r>
+              <a:rPr lang="en-US" dirty="0"/>
+              <a:t> speaker mentoring)</a:t>
+            </a:r>
+          </a:p>
+          <a:p>
+            <a:pPr lvl="1"/>
+            <a:r>
+              <a:rPr lang="en-US" dirty="0"/>
+              <a:t>Conference organizer (Joy of Coding)</a:t>
+            </a:r>
+          </a:p>
+          <a:p>
+            <a:pPr lvl="1"/>
+            <a:endParaRPr lang="en-NL" dirty="0"/>
           </a:p>
         </p:txBody>
       </p:sp>
     </p:spTree>
     <p:extLst>
       <p:ext uri="{BB962C8B-B14F-4D97-AF65-F5344CB8AC3E}">
-        <p14:creationId xmlns:p14="http://schemas.microsoft.com/office/powerpoint/2010/main" val="1108842719"/>
+        <p14:creationId xmlns:p14="http://schemas.microsoft.com/office/powerpoint/2010/main" val="346692757"/>
       </p:ext>
     </p:extLst>
   </p:cSld>
   <p:clrMapOvr>
     <a:masterClrMapping/>
   </p:clrMapOvr>
-  <p:timing>
-    <p:tnLst>
-      <p:par>
-        <p:cTn id="1" dur="indefinite" restart="never" nodeType="tmRoot"/>
-      </p:par>
-    </p:tnLst>
-  </p:timing>
 </p:sld>
 </file>
 
@@ -4009,7 +4131,13 @@
       </p:grpSpPr>
       <p:sp>
         <p:nvSpPr>
-          <p:cNvPr id="2" name="Title 1"/>
+          <p:cNvPr id="2" name="Title 1">
+            <a:extLst>
+              <a:ext uri="{FF2B5EF4-FFF2-40B4-BE49-F238E27FC236}">
+                <a16:creationId xmlns:a16="http://schemas.microsoft.com/office/drawing/2014/main" id="{1636CE53-567F-47FC-A707-4488C5C83375}"/>
+              </a:ext>
+            </a:extLst>
+          </p:cNvPr>
           <p:cNvSpPr>
             <a:spLocks noGrp="1"/>
           </p:cNvSpPr>
@@ -4024,14 +4152,21 @@
           <a:p>
             <a:r>
               <a:rPr lang="en-US" dirty="0"/>
-              <a:t>Possible splitting criteria</a:t>
-            </a:r>
-          </a:p>
-        </p:txBody>
-      </p:sp>
-      <p:sp>
-        <p:nvSpPr>
-          <p:cNvPr id="3" name="Content Placeholder 2"/>
+              <a:t>Who are we?</a:t>
+            </a:r>
+            <a:endParaRPr lang="en-NL" dirty="0"/>
+          </a:p>
+        </p:txBody>
+      </p:sp>
+      <p:sp>
+        <p:nvSpPr>
+          <p:cNvPr id="3" name="Content Placeholder 2">
+            <a:extLst>
+              <a:ext uri="{FF2B5EF4-FFF2-40B4-BE49-F238E27FC236}">
+                <a16:creationId xmlns:a16="http://schemas.microsoft.com/office/drawing/2014/main" id="{86CA2DA7-3D9F-44E7-9DDA-C1521CD4BEDD}"/>
+              </a:ext>
+            </a:extLst>
+          </p:cNvPr>
           <p:cNvSpPr>
             <a:spLocks noGrp="1"/>
           </p:cNvSpPr>
@@ -4045,62 +4180,71 @@
           <a:lstStyle/>
           <a:p>
             <a:r>
-              <a:rPr lang="en-US" dirty="0"/>
-              <a:t>Implementation technology</a:t>
-            </a:r>
+              <a:rPr lang="en-US" dirty="0" err="1"/>
+              <a:t>Régina</a:t>
+            </a:r>
+            <a:r>
+              <a:rPr lang="en-US" dirty="0"/>
+              <a:t> ten </a:t>
+            </a:r>
+            <a:r>
+              <a:rPr lang="en-US" dirty="0" err="1"/>
+              <a:t>Bruggencate</a:t>
+            </a:r>
+            <a:endParaRPr lang="en-US" dirty="0"/>
           </a:p>
           <a:p>
             <a:pPr lvl="1"/>
             <a:r>
               <a:rPr lang="en-US" dirty="0"/>
-              <a:t>Computationally heavy </a:t>
+              <a:t>Java Developer (19 years)</a:t>
             </a:r>
           </a:p>
           <a:p>
             <a:pPr lvl="1"/>
             <a:r>
               <a:rPr lang="en-US" dirty="0"/>
-              <a:t>I/O heavy </a:t>
-            </a:r>
-          </a:p>
-          <a:p>
-            <a:r>
-              <a:rPr lang="en-US" dirty="0"/>
-              <a:t>Geography </a:t>
+              <a:t>Java Champion (2011)</a:t>
             </a:r>
           </a:p>
           <a:p>
             <a:pPr lvl="1"/>
             <a:r>
               <a:rPr lang="en-US" dirty="0"/>
-              <a:t>location of team </a:t>
-            </a:r>
-          </a:p>
-          <a:p>
-            <a:r>
-              <a:rPr lang="en-US" dirty="0"/>
-              <a:t>Domain Driven Design </a:t>
-            </a:r>
+              <a:t>Duchess board member</a:t>
+            </a:r>
+          </a:p>
+          <a:p>
+            <a:pPr lvl="1"/>
+            <a:r>
+              <a:rPr lang="en-US" dirty="0" err="1"/>
+              <a:t>Rolemodel</a:t>
+            </a:r>
+            <a:r>
+              <a:rPr lang="en-US" dirty="0"/>
+              <a:t> (Devoxx4Kids)</a:t>
+            </a:r>
+          </a:p>
+          <a:p>
+            <a:pPr lvl="1"/>
+            <a:endParaRPr lang="en-US" dirty="0"/>
+          </a:p>
+          <a:p>
+            <a:pPr lvl="1"/>
+            <a:endParaRPr lang="en-NL" dirty="0"/>
           </a:p>
         </p:txBody>
       </p:sp>
     </p:spTree>
     <p:extLst>
       <p:ext uri="{BB962C8B-B14F-4D97-AF65-F5344CB8AC3E}">
-        <p14:creationId xmlns:p14="http://schemas.microsoft.com/office/powerpoint/2010/main" val="2161745616"/>
+        <p14:creationId xmlns:p14="http://schemas.microsoft.com/office/powerpoint/2010/main" val="1376470474"/>
       </p:ext>
     </p:extLst>
   </p:cSld>
   <p:clrMapOvr>
     <a:masterClrMapping/>
   </p:clrMapOvr>
-  <p:timing>
-    <p:tnLst>
-      <p:par>
-        <p:cTn id="1" dur="indefinite" restart="never" nodeType="tmRoot"/>
-      </p:par>
-    </p:tnLst>
-  </p:timing>
 </p:sld>
 </file>
 
@@ -4123,7 +4267,13 @@
       </p:grpSpPr>
       <p:sp>
         <p:nvSpPr>
-          <p:cNvPr id="2" name="Title 1"/>
+          <p:cNvPr id="2" name="Title 1">
+            <a:extLst>
+              <a:ext uri="{FF2B5EF4-FFF2-40B4-BE49-F238E27FC236}">
+                <a16:creationId xmlns:a16="http://schemas.microsoft.com/office/drawing/2014/main" id="{1636CE53-567F-47FC-A707-4488C5C83375}"/>
+              </a:ext>
+            </a:extLst>
+          </p:cNvPr>
           <p:cNvSpPr>
             <a:spLocks noGrp="1"/>
           </p:cNvSpPr>
@@ -4138,104 +4288,321 @@
           <a:p>
             <a:r>
               <a:rPr lang="en-US" dirty="0"/>
-              <a:t>DDD terms explained</a:t>
-            </a:r>
-          </a:p>
-        </p:txBody>
-      </p:sp>
-      <p:sp>
-        <p:nvSpPr>
-          <p:cNvPr id="3" name="Content Placeholder 2"/>
-          <p:cNvSpPr>
-            <a:spLocks noGrp="1"/>
-          </p:cNvSpPr>
-          <p:nvPr>
-            <p:ph idx="1"/>
-          </p:nvPr>
-        </p:nvSpPr>
-        <p:spPr/>
-        <p:txBody>
-          <a:bodyPr>
-            <a:normAutofit/>
-          </a:bodyPr>
-          <a:lstStyle/>
-          <a:p>
-            <a:r>
-              <a:rPr lang="en-US" dirty="0"/>
-              <a:t>domain </a:t>
-            </a:r>
-          </a:p>
-          <a:p>
-            <a:r>
-              <a:rPr lang="en-US" dirty="0"/>
-              <a:t>model </a:t>
-            </a:r>
-          </a:p>
-          <a:p>
-            <a:r>
-              <a:rPr lang="en-US" dirty="0"/>
-              <a:t>ubiquitous language </a:t>
-            </a:r>
-          </a:p>
-          <a:p>
-            <a:r>
-              <a:rPr lang="en-US" dirty="0"/>
-              <a:t>context </a:t>
-            </a:r>
-          </a:p>
-          <a:p>
-            <a:r>
-              <a:rPr lang="en-US" dirty="0"/>
-              <a:t>bounded context </a:t>
-            </a:r>
-          </a:p>
-        </p:txBody>
-      </p:sp>
-      <p:pic>
-        <p:nvPicPr>
-          <p:cNvPr id="1026" name="Picture 2" descr="http://martinfowler.com/bliki/images/boundedContext/sketch.png"/>
-          <p:cNvPicPr>
-            <a:picLocks noChangeAspect="1" noChangeArrowheads="1"/>
-          </p:cNvPicPr>
-          <p:nvPr/>
-        </p:nvPicPr>
-        <p:blipFill>
-          <a:blip r:embed="rId2">
+              <a:t>Who are we?</a:t>
+            </a:r>
+            <a:endParaRPr lang="en-NL" dirty="0"/>
+          </a:p>
+        </p:txBody>
+      </p:sp>
+      <p:sp>
+        <p:nvSpPr>
+          <p:cNvPr id="3" name="Content Placeholder 2">
             <a:extLst>
-              <a:ext uri="{28A0092B-C50C-407E-A947-70E740481C1C}">
-                <a14:useLocalDpi xmlns:a14="http://schemas.microsoft.com/office/drawing/2010/main" val="0"/>
+              <a:ext uri="{FF2B5EF4-FFF2-40B4-BE49-F238E27FC236}">
+                <a16:creationId xmlns:a16="http://schemas.microsoft.com/office/drawing/2014/main" id="{86CA2DA7-3D9F-44E7-9DDA-C1521CD4BEDD}"/>
               </a:ext>
             </a:extLst>
-          </a:blip>
-          <a:srcRect/>
-          <a:stretch>
-            <a:fillRect/>
-          </a:stretch>
-        </p:blipFill>
-        <p:spPr bwMode="auto">
-          <a:xfrm>
-            <a:off x="3657600" y="2096716"/>
-            <a:ext cx="4803555" cy="2974222"/>
-          </a:xfrm>
-          <a:prstGeom prst="rect">
-            <a:avLst/>
-          </a:prstGeom>
-          <a:noFill/>
-          <a:extLst>
-            <a:ext uri="{909E8E84-426E-40DD-AFC4-6F175D3DCCD1}">
-              <a14:hiddenFill xmlns:a14="http://schemas.microsoft.com/office/drawing/2010/main">
-                <a:solidFill>
-                  <a:srgbClr val="FFFFFF"/>
-                </a:solidFill>
-              </a14:hiddenFill>
-            </a:ext>
-          </a:extLst>
-        </p:spPr>
-      </p:pic>
+          </p:cNvPr>
+          <p:cNvSpPr>
+            <a:spLocks noGrp="1"/>
+          </p:cNvSpPr>
+          <p:nvPr>
+            <p:ph idx="1"/>
+          </p:nvPr>
+        </p:nvSpPr>
+        <p:spPr/>
+        <p:txBody>
+          <a:bodyPr/>
+          <a:lstStyle/>
+          <a:p>
+            <a:r>
+              <a:rPr lang="en-US" dirty="0"/>
+              <a:t>Joanne </a:t>
+            </a:r>
+            <a:r>
+              <a:rPr lang="en-US" dirty="0" err="1"/>
+              <a:t>Boerstoel</a:t>
+            </a:r>
+            <a:endParaRPr lang="en-US" dirty="0"/>
+          </a:p>
+          <a:p>
+            <a:pPr lvl="1"/>
+            <a:r>
+              <a:rPr lang="en-US" dirty="0"/>
+              <a:t>Scrum Master &amp; agile coach (12 years)</a:t>
+            </a:r>
+          </a:p>
+          <a:p>
+            <a:pPr lvl="1"/>
+            <a:r>
+              <a:rPr lang="en-US" dirty="0"/>
+              <a:t>Signatory of the Agnostic Agile Manifesto</a:t>
+            </a:r>
+          </a:p>
+          <a:p>
+            <a:pPr lvl="1"/>
+            <a:r>
+              <a:rPr lang="en-US" dirty="0"/>
+              <a:t>Co-organizer of  the first Dutch ‘Women in Agile’ conference</a:t>
+            </a:r>
+          </a:p>
+          <a:p>
+            <a:pPr lvl="1"/>
+            <a:r>
+              <a:rPr lang="en-US" dirty="0"/>
+              <a:t>Geologist</a:t>
+            </a:r>
+          </a:p>
+          <a:p>
+            <a:pPr lvl="1"/>
+            <a:endParaRPr lang="en-NL" dirty="0"/>
+          </a:p>
+        </p:txBody>
+      </p:sp>
     </p:spTree>
     <p:extLst>
       <p:ext uri="{BB962C8B-B14F-4D97-AF65-F5344CB8AC3E}">
-        <p14:creationId xmlns:p14="http://schemas.microsoft.com/office/powerpoint/2010/main" val="1716983031"/>
+        <p14:creationId xmlns:p14="http://schemas.microsoft.com/office/powerpoint/2010/main" val="3915917453"/>
+      </p:ext>
+    </p:extLst>
+  </p:cSld>
+  <p:clrMapOvr>
+    <a:masterClrMapping/>
+  </p:clrMapOvr>
+</p:sld>
+</file>
+
+<file path=ppt/slides/slide5.xml><?xml version="1.0" encoding="utf-8"?>
+<p:sld xmlns:a="http://schemas.openxmlformats.org/drawingml/2006/main" xmlns:r="http://schemas.openxmlformats.org/officeDocument/2006/relationships" xmlns:p="http://schemas.openxmlformats.org/presentationml/2006/main">
+  <p:cSld>
+    <p:spTree>
+      <p:nvGrpSpPr>
+        <p:cNvPr id="1" name=""/>
+        <p:cNvGrpSpPr/>
+        <p:nvPr/>
+      </p:nvGrpSpPr>
+      <p:grpSpPr>
+        <a:xfrm>
+          <a:off x="0" y="0"/>
+          <a:ext cx="0" cy="0"/>
+          <a:chOff x="0" y="0"/>
+          <a:chExt cx="0" cy="0"/>
+        </a:xfrm>
+      </p:grpSpPr>
+      <p:sp>
+        <p:nvSpPr>
+          <p:cNvPr id="2" name="Title 1">
+            <a:extLst>
+              <a:ext uri="{FF2B5EF4-FFF2-40B4-BE49-F238E27FC236}">
+                <a16:creationId xmlns:a16="http://schemas.microsoft.com/office/drawing/2014/main" id="{48F613B9-0A5F-4D05-B5E4-058E634A9A0D}"/>
+              </a:ext>
+            </a:extLst>
+          </p:cNvPr>
+          <p:cNvSpPr>
+            <a:spLocks noGrp="1"/>
+          </p:cNvSpPr>
+          <p:nvPr>
+            <p:ph type="title"/>
+          </p:nvPr>
+        </p:nvSpPr>
+        <p:spPr/>
+        <p:txBody>
+          <a:bodyPr/>
+          <a:lstStyle/>
+          <a:p>
+            <a:r>
+              <a:rPr lang="en-US" dirty="0"/>
+              <a:t>Agenda</a:t>
+            </a:r>
+            <a:endParaRPr lang="en-NL" dirty="0"/>
+          </a:p>
+        </p:txBody>
+      </p:sp>
+      <p:sp>
+        <p:nvSpPr>
+          <p:cNvPr id="3" name="Content Placeholder 2">
+            <a:extLst>
+              <a:ext uri="{FF2B5EF4-FFF2-40B4-BE49-F238E27FC236}">
+                <a16:creationId xmlns:a16="http://schemas.microsoft.com/office/drawing/2014/main" id="{D34DDA2F-81BE-46FC-86C1-489DF24A7A59}"/>
+              </a:ext>
+            </a:extLst>
+          </p:cNvPr>
+          <p:cNvSpPr>
+            <a:spLocks noGrp="1"/>
+          </p:cNvSpPr>
+          <p:nvPr>
+            <p:ph idx="1"/>
+          </p:nvPr>
+        </p:nvSpPr>
+        <p:spPr/>
+        <p:txBody>
+          <a:bodyPr/>
+          <a:lstStyle/>
+          <a:p>
+            <a:r>
+              <a:rPr lang="en-US" dirty="0"/>
+              <a:t>Introduction</a:t>
+            </a:r>
+          </a:p>
+          <a:p>
+            <a:r>
+              <a:rPr lang="en-US" dirty="0"/>
+              <a:t>Explanation of the problem domain</a:t>
+            </a:r>
+          </a:p>
+          <a:p>
+            <a:r>
+              <a:rPr lang="en-US" dirty="0"/>
+              <a:t>Brainstorming the division</a:t>
+            </a:r>
+          </a:p>
+          <a:p>
+            <a:r>
+              <a:rPr lang="en-US" dirty="0"/>
+              <a:t>Programming the microservices</a:t>
+            </a:r>
+            <a:endParaRPr lang="en-NL" dirty="0"/>
+          </a:p>
+        </p:txBody>
+      </p:sp>
+    </p:spTree>
+    <p:extLst>
+      <p:ext uri="{BB962C8B-B14F-4D97-AF65-F5344CB8AC3E}">
+        <p14:creationId xmlns:p14="http://schemas.microsoft.com/office/powerpoint/2010/main" val="395713694"/>
+      </p:ext>
+    </p:extLst>
+  </p:cSld>
+  <p:clrMapOvr>
+    <a:masterClrMapping/>
+  </p:clrMapOvr>
+</p:sld>
+</file>
+
+<file path=ppt/slides/slide6.xml><?xml version="1.0" encoding="utf-8"?>
+<p:sld xmlns:a="http://schemas.openxmlformats.org/drawingml/2006/main" xmlns:r="http://schemas.openxmlformats.org/officeDocument/2006/relationships" xmlns:p="http://schemas.openxmlformats.org/presentationml/2006/main">
+  <p:cSld>
+    <p:spTree>
+      <p:nvGrpSpPr>
+        <p:cNvPr id="1" name=""/>
+        <p:cNvGrpSpPr/>
+        <p:nvPr/>
+      </p:nvGrpSpPr>
+      <p:grpSpPr>
+        <a:xfrm>
+          <a:off x="0" y="0"/>
+          <a:ext cx="0" cy="0"/>
+          <a:chOff x="0" y="0"/>
+          <a:chExt cx="0" cy="0"/>
+        </a:xfrm>
+      </p:grpSpPr>
+      <p:sp>
+        <p:nvSpPr>
+          <p:cNvPr id="2" name="Title 1"/>
+          <p:cNvSpPr>
+            <a:spLocks noGrp="1"/>
+          </p:cNvSpPr>
+          <p:nvPr>
+            <p:ph type="title"/>
+          </p:nvPr>
+        </p:nvSpPr>
+        <p:spPr/>
+        <p:txBody>
+          <a:bodyPr/>
+          <a:lstStyle/>
+          <a:p>
+            <a:r>
+              <a:rPr lang="en-US" dirty="0"/>
+              <a:t>‘Easy ways’ of splitting</a:t>
+            </a:r>
+          </a:p>
+        </p:txBody>
+      </p:sp>
+      <p:sp>
+        <p:nvSpPr>
+          <p:cNvPr id="3" name="Content Placeholder 2"/>
+          <p:cNvSpPr>
+            <a:spLocks noGrp="1"/>
+          </p:cNvSpPr>
+          <p:nvPr>
+            <p:ph idx="1"/>
+          </p:nvPr>
+        </p:nvSpPr>
+        <p:spPr/>
+        <p:txBody>
+          <a:bodyPr/>
+          <a:lstStyle/>
+          <a:p>
+            <a:r>
+              <a:rPr lang="en-US" dirty="0"/>
+              <a:t>Layers</a:t>
+            </a:r>
+          </a:p>
+          <a:p>
+            <a:pPr lvl="1"/>
+            <a:r>
+              <a:rPr lang="en-US" dirty="0"/>
+              <a:t>Java package structure</a:t>
+            </a:r>
+          </a:p>
+          <a:p>
+            <a:r>
+              <a:rPr lang="en-US" dirty="0"/>
+              <a:t>Technology</a:t>
+            </a:r>
+          </a:p>
+          <a:p>
+            <a:pPr lvl="1"/>
+            <a:r>
+              <a:rPr lang="en-US" dirty="0"/>
+              <a:t>Language/Framework (EJB, MongoDB, NodeJS)</a:t>
+            </a:r>
+          </a:p>
+          <a:p>
+            <a:pPr lvl="1"/>
+            <a:r>
+              <a:rPr lang="en-US" dirty="0"/>
+              <a:t>Computationally heavy </a:t>
+            </a:r>
+          </a:p>
+          <a:p>
+            <a:pPr lvl="1"/>
+            <a:r>
+              <a:rPr lang="en-US" dirty="0"/>
+              <a:t>I/O heavy </a:t>
+            </a:r>
+          </a:p>
+          <a:p>
+            <a:r>
+              <a:rPr lang="en-US" dirty="0"/>
+              <a:t>Geography </a:t>
+            </a:r>
+          </a:p>
+          <a:p>
+            <a:pPr lvl="1"/>
+            <a:r>
+              <a:rPr lang="en-US" dirty="0"/>
+              <a:t>location of team </a:t>
+            </a:r>
+          </a:p>
+          <a:p>
+            <a:r>
+              <a:rPr lang="en-US" dirty="0"/>
+              <a:t>Entity </a:t>
+            </a:r>
+          </a:p>
+          <a:p>
+            <a:pPr lvl="1"/>
+            <a:r>
+              <a:rPr lang="en-US" dirty="0"/>
+              <a:t>user, product, purchase</a:t>
+            </a:r>
+          </a:p>
+        </p:txBody>
+      </p:sp>
+    </p:spTree>
+    <p:extLst>
+      <p:ext uri="{BB962C8B-B14F-4D97-AF65-F5344CB8AC3E}">
+        <p14:creationId xmlns:p14="http://schemas.microsoft.com/office/powerpoint/2010/main" val="2161745616"/>
       </p:ext>
     </p:extLst>
   </p:cSld>
@@ -4263,7 +4630,7 @@
                             </p:stCondLst>
                             <p:childTnLst>
                               <p:par>
-                                <p:cTn id="5" presetID="1" presetClass="entr" presetSubtype="0" fill="hold" nodeType="clickEffect">
+                                <p:cTn id="5" presetID="1" presetClass="entr" presetSubtype="0" fill="hold" grpId="0" nodeType="clickEffect">
                                   <p:stCondLst>
                                     <p:cond delay="0"/>
                                   </p:stCondLst>
@@ -4276,7 +4643,344 @@
                                           </p:stCondLst>
                                         </p:cTn>
                                         <p:tgtEl>
-                                          <p:spTgt spid="1026"/>
+                                          <p:spTgt spid="3">
+                                            <p:txEl>
+                                              <p:pRg st="0" end="0"/>
+                                            </p:txEl>
+                                          </p:spTgt>
+                                        </p:tgtEl>
+                                        <p:attrNameLst>
+                                          <p:attrName>style.visibility</p:attrName>
+                                        </p:attrNameLst>
+                                      </p:cBhvr>
+                                      <p:to>
+                                        <p:strVal val="visible"/>
+                                      </p:to>
+                                    </p:set>
+                                  </p:childTnLst>
+                                </p:cTn>
+                              </p:par>
+                              <p:par>
+                                <p:cTn id="7" presetID="1" presetClass="entr" presetSubtype="0" fill="hold" grpId="0" nodeType="withEffect">
+                                  <p:stCondLst>
+                                    <p:cond delay="0"/>
+                                  </p:stCondLst>
+                                  <p:childTnLst>
+                                    <p:set>
+                                      <p:cBhvr>
+                                        <p:cTn id="8" dur="1" fill="hold">
+                                          <p:stCondLst>
+                                            <p:cond delay="0"/>
+                                          </p:stCondLst>
+                                        </p:cTn>
+                                        <p:tgtEl>
+                                          <p:spTgt spid="3">
+                                            <p:txEl>
+                                              <p:pRg st="1" end="1"/>
+                                            </p:txEl>
+                                          </p:spTgt>
+                                        </p:tgtEl>
+                                        <p:attrNameLst>
+                                          <p:attrName>style.visibility</p:attrName>
+                                        </p:attrNameLst>
+                                      </p:cBhvr>
+                                      <p:to>
+                                        <p:strVal val="visible"/>
+                                      </p:to>
+                                    </p:set>
+                                  </p:childTnLst>
+                                </p:cTn>
+                              </p:par>
+                            </p:childTnLst>
+                          </p:cTn>
+                        </p:par>
+                      </p:childTnLst>
+                    </p:cTn>
+                  </p:par>
+                  <p:par>
+                    <p:cTn id="9" fill="hold">
+                      <p:stCondLst>
+                        <p:cond delay="indefinite"/>
+                      </p:stCondLst>
+                      <p:childTnLst>
+                        <p:par>
+                          <p:cTn id="10" fill="hold">
+                            <p:stCondLst>
+                              <p:cond delay="0"/>
+                            </p:stCondLst>
+                            <p:childTnLst>
+                              <p:par>
+                                <p:cTn id="11" presetID="1" presetClass="entr" presetSubtype="0" fill="hold" grpId="0" nodeType="clickEffect">
+                                  <p:stCondLst>
+                                    <p:cond delay="0"/>
+                                  </p:stCondLst>
+                                  <p:childTnLst>
+                                    <p:set>
+                                      <p:cBhvr>
+                                        <p:cTn id="12" dur="1" fill="hold">
+                                          <p:stCondLst>
+                                            <p:cond delay="0"/>
+                                          </p:stCondLst>
+                                        </p:cTn>
+                                        <p:tgtEl>
+                                          <p:spTgt spid="3">
+                                            <p:txEl>
+                                              <p:pRg st="2" end="2"/>
+                                            </p:txEl>
+                                          </p:spTgt>
+                                        </p:tgtEl>
+                                        <p:attrNameLst>
+                                          <p:attrName>style.visibility</p:attrName>
+                                        </p:attrNameLst>
+                                      </p:cBhvr>
+                                      <p:to>
+                                        <p:strVal val="visible"/>
+                                      </p:to>
+                                    </p:set>
+                                  </p:childTnLst>
+                                </p:cTn>
+                              </p:par>
+                              <p:par>
+                                <p:cTn id="13" presetID="1" presetClass="entr" presetSubtype="0" fill="hold" grpId="0" nodeType="withEffect">
+                                  <p:stCondLst>
+                                    <p:cond delay="0"/>
+                                  </p:stCondLst>
+                                  <p:childTnLst>
+                                    <p:set>
+                                      <p:cBhvr>
+                                        <p:cTn id="14" dur="1" fill="hold">
+                                          <p:stCondLst>
+                                            <p:cond delay="0"/>
+                                          </p:stCondLst>
+                                        </p:cTn>
+                                        <p:tgtEl>
+                                          <p:spTgt spid="3">
+                                            <p:txEl>
+                                              <p:pRg st="3" end="3"/>
+                                            </p:txEl>
+                                          </p:spTgt>
+                                        </p:tgtEl>
+                                        <p:attrNameLst>
+                                          <p:attrName>style.visibility</p:attrName>
+                                        </p:attrNameLst>
+                                      </p:cBhvr>
+                                      <p:to>
+                                        <p:strVal val="visible"/>
+                                      </p:to>
+                                    </p:set>
+                                  </p:childTnLst>
+                                </p:cTn>
+                              </p:par>
+                              <p:par>
+                                <p:cTn id="15" presetID="1" presetClass="entr" presetSubtype="0" fill="hold" grpId="0" nodeType="withEffect">
+                                  <p:stCondLst>
+                                    <p:cond delay="0"/>
+                                  </p:stCondLst>
+                                  <p:childTnLst>
+                                    <p:set>
+                                      <p:cBhvr>
+                                        <p:cTn id="16" dur="1" fill="hold">
+                                          <p:stCondLst>
+                                            <p:cond delay="0"/>
+                                          </p:stCondLst>
+                                        </p:cTn>
+                                        <p:tgtEl>
+                                          <p:spTgt spid="3">
+                                            <p:txEl>
+                                              <p:pRg st="4" end="4"/>
+                                            </p:txEl>
+                                          </p:spTgt>
+                                        </p:tgtEl>
+                                        <p:attrNameLst>
+                                          <p:attrName>style.visibility</p:attrName>
+                                        </p:attrNameLst>
+                                      </p:cBhvr>
+                                      <p:to>
+                                        <p:strVal val="visible"/>
+                                      </p:to>
+                                    </p:set>
+                                  </p:childTnLst>
+                                </p:cTn>
+                              </p:par>
+                              <p:par>
+                                <p:cTn id="17" presetID="1" presetClass="entr" presetSubtype="0" fill="hold" grpId="0" nodeType="withEffect">
+                                  <p:stCondLst>
+                                    <p:cond delay="0"/>
+                                  </p:stCondLst>
+                                  <p:childTnLst>
+                                    <p:set>
+                                      <p:cBhvr>
+                                        <p:cTn id="18" dur="1" fill="hold">
+                                          <p:stCondLst>
+                                            <p:cond delay="0"/>
+                                          </p:stCondLst>
+                                        </p:cTn>
+                                        <p:tgtEl>
+                                          <p:spTgt spid="3">
+                                            <p:txEl>
+                                              <p:pRg st="5" end="5"/>
+                                            </p:txEl>
+                                          </p:spTgt>
+                                        </p:tgtEl>
+                                        <p:attrNameLst>
+                                          <p:attrName>style.visibility</p:attrName>
+                                        </p:attrNameLst>
+                                      </p:cBhvr>
+                                      <p:to>
+                                        <p:strVal val="visible"/>
+                                      </p:to>
+                                    </p:set>
+                                  </p:childTnLst>
+                                </p:cTn>
+                              </p:par>
+                            </p:childTnLst>
+                          </p:cTn>
+                        </p:par>
+                      </p:childTnLst>
+                    </p:cTn>
+                  </p:par>
+                  <p:par>
+                    <p:cTn id="19" fill="hold">
+                      <p:stCondLst>
+                        <p:cond delay="indefinite"/>
+                      </p:stCondLst>
+                      <p:childTnLst>
+                        <p:par>
+                          <p:cTn id="20" fill="hold">
+                            <p:stCondLst>
+                              <p:cond delay="0"/>
+                            </p:stCondLst>
+                            <p:childTnLst>
+                              <p:par>
+                                <p:cTn id="21" presetID="1" presetClass="entr" presetSubtype="0" fill="hold" grpId="0" nodeType="clickEffect">
+                                  <p:stCondLst>
+                                    <p:cond delay="0"/>
+                                  </p:stCondLst>
+                                  <p:childTnLst>
+                                    <p:set>
+                                      <p:cBhvr>
+                                        <p:cTn id="22" dur="1" fill="hold">
+                                          <p:stCondLst>
+                                            <p:cond delay="0"/>
+                                          </p:stCondLst>
+                                        </p:cTn>
+                                        <p:tgtEl>
+                                          <p:spTgt spid="3">
+                                            <p:txEl>
+                                              <p:pRg st="6" end="6"/>
+                                            </p:txEl>
+                                          </p:spTgt>
+                                        </p:tgtEl>
+                                        <p:attrNameLst>
+                                          <p:attrName>style.visibility</p:attrName>
+                                        </p:attrNameLst>
+                                      </p:cBhvr>
+                                      <p:to>
+                                        <p:strVal val="visible"/>
+                                      </p:to>
+                                    </p:set>
+                                  </p:childTnLst>
+                                </p:cTn>
+                              </p:par>
+                              <p:par>
+                                <p:cTn id="23" presetID="1" presetClass="entr" presetSubtype="0" fill="hold" grpId="0" nodeType="withEffect">
+                                  <p:stCondLst>
+                                    <p:cond delay="0"/>
+                                  </p:stCondLst>
+                                  <p:childTnLst>
+                                    <p:set>
+                                      <p:cBhvr>
+                                        <p:cTn id="24" dur="1" fill="hold">
+                                          <p:stCondLst>
+                                            <p:cond delay="0"/>
+                                          </p:stCondLst>
+                                        </p:cTn>
+                                        <p:tgtEl>
+                                          <p:spTgt spid="3">
+                                            <p:txEl>
+                                              <p:pRg st="7" end="7"/>
+                                            </p:txEl>
+                                          </p:spTgt>
+                                        </p:tgtEl>
+                                        <p:attrNameLst>
+                                          <p:attrName>style.visibility</p:attrName>
+                                        </p:attrNameLst>
+                                      </p:cBhvr>
+                                      <p:to>
+                                        <p:strVal val="visible"/>
+                                      </p:to>
+                                    </p:set>
+                                  </p:childTnLst>
+                                </p:cTn>
+                              </p:par>
+                            </p:childTnLst>
+                          </p:cTn>
+                        </p:par>
+                      </p:childTnLst>
+                    </p:cTn>
+                  </p:par>
+                  <p:par>
+                    <p:cTn id="25" fill="hold">
+                      <p:stCondLst>
+                        <p:cond delay="indefinite"/>
+                      </p:stCondLst>
+                      <p:childTnLst>
+                        <p:par>
+                          <p:cTn id="26" fill="hold">
+                            <p:stCondLst>
+                              <p:cond delay="0"/>
+                            </p:stCondLst>
+                            <p:childTnLst>
+                              <p:par>
+                                <p:cTn id="27" presetID="1" presetClass="entr" presetSubtype="0" fill="hold" grpId="0" nodeType="clickEffect">
+                                  <p:stCondLst>
+                                    <p:cond delay="0"/>
+                                  </p:stCondLst>
+                                  <p:childTnLst>
+                                    <p:set>
+                                      <p:cBhvr>
+                                        <p:cTn id="28" dur="1" fill="hold">
+                                          <p:stCondLst>
+                                            <p:cond delay="0"/>
+                                          </p:stCondLst>
+                                        </p:cTn>
+                                        <p:tgtEl>
+                                          <p:spTgt spid="3">
+                                            <p:txEl>
+                                              <p:pRg st="8" end="8"/>
+                                            </p:txEl>
+                                          </p:spTgt>
+                                        </p:tgtEl>
+                                        <p:attrNameLst>
+                                          <p:attrName>style.visibility</p:attrName>
+                                        </p:attrNameLst>
+                                      </p:cBhvr>
+                                      <p:to>
+                                        <p:strVal val="visible"/>
+                                      </p:to>
+                                    </p:set>
+                                  </p:childTnLst>
+                                </p:cTn>
+                              </p:par>
+                              <p:par>
+                                <p:cTn id="29" presetID="1" presetClass="entr" presetSubtype="0" fill="hold" grpId="0" nodeType="withEffect">
+                                  <p:stCondLst>
+                                    <p:cond delay="0"/>
+                                  </p:stCondLst>
+                                  <p:childTnLst>
+                                    <p:set>
+                                      <p:cBhvr>
+                                        <p:cTn id="30" dur="1" fill="hold">
+                                          <p:stCondLst>
+                                            <p:cond delay="0"/>
+                                          </p:stCondLst>
+                                        </p:cTn>
+                                        <p:tgtEl>
+                                          <p:spTgt spid="3">
+                                            <p:txEl>
+                                              <p:pRg st="9" end="9"/>
+                                            </p:txEl>
+                                          </p:spTgt>
                                         </p:tgtEl>
                                         <p:attrNameLst>
                                           <p:attrName>style.visibility</p:attrName>
@@ -4316,204 +5020,9 @@
         </p:cTn>
       </p:par>
     </p:tnLst>
-  </p:timing>
-</p:sld>
-</file>
-
-<file path=ppt/slides/slide5.xml><?xml version="1.0" encoding="utf-8"?>
-<p:sld xmlns:a="http://schemas.openxmlformats.org/drawingml/2006/main" xmlns:r="http://schemas.openxmlformats.org/officeDocument/2006/relationships" xmlns:p="http://schemas.openxmlformats.org/presentationml/2006/main">
-  <p:cSld>
-    <p:spTree>
-      <p:nvGrpSpPr>
-        <p:cNvPr id="1" name=""/>
-        <p:cNvGrpSpPr/>
-        <p:nvPr/>
-      </p:nvGrpSpPr>
-      <p:grpSpPr>
-        <a:xfrm>
-          <a:off x="0" y="0"/>
-          <a:ext cx="0" cy="0"/>
-          <a:chOff x="0" y="0"/>
-          <a:chExt cx="0" cy="0"/>
-        </a:xfrm>
-      </p:grpSpPr>
-      <p:sp>
-        <p:nvSpPr>
-          <p:cNvPr id="2" name="Title 1"/>
-          <p:cNvSpPr>
-            <a:spLocks noGrp="1"/>
-          </p:cNvSpPr>
-          <p:nvPr>
-            <p:ph type="title"/>
-          </p:nvPr>
-        </p:nvSpPr>
-        <p:spPr/>
-        <p:txBody>
-          <a:bodyPr/>
-          <a:lstStyle/>
-          <a:p>
-            <a:r>
-              <a:rPr lang="en-US" dirty="0"/>
-              <a:t>Building blocks</a:t>
-            </a:r>
-          </a:p>
-        </p:txBody>
-      </p:sp>
-      <p:sp>
-        <p:nvSpPr>
-          <p:cNvPr id="3" name="Content Placeholder 2"/>
-          <p:cNvSpPr>
-            <a:spLocks noGrp="1"/>
-          </p:cNvSpPr>
-          <p:nvPr>
-            <p:ph idx="1"/>
-          </p:nvPr>
-        </p:nvSpPr>
-        <p:spPr/>
-        <p:txBody>
-          <a:bodyPr/>
-          <a:lstStyle/>
-          <a:p>
-            <a:r>
-              <a:rPr lang="en-US" dirty="0"/>
-              <a:t>layered architecture </a:t>
-            </a:r>
-          </a:p>
-          <a:p>
-            <a:r>
-              <a:rPr lang="en-US" dirty="0"/>
-              <a:t>entities </a:t>
-            </a:r>
-          </a:p>
-          <a:p>
-            <a:r>
-              <a:rPr lang="en-US" dirty="0"/>
-              <a:t>value objects </a:t>
-            </a:r>
-          </a:p>
-          <a:p>
-            <a:r>
-              <a:rPr lang="en-US" dirty="0"/>
-              <a:t>domain events </a:t>
-            </a:r>
-          </a:p>
-          <a:p>
-            <a:r>
-              <a:rPr lang="en-US" dirty="0"/>
-              <a:t>services</a:t>
-            </a:r>
-          </a:p>
-        </p:txBody>
-      </p:sp>
-    </p:spTree>
-    <p:extLst>
-      <p:ext uri="{BB962C8B-B14F-4D97-AF65-F5344CB8AC3E}">
-        <p14:creationId xmlns:p14="http://schemas.microsoft.com/office/powerpoint/2010/main" val="2536248336"/>
-      </p:ext>
-    </p:extLst>
-  </p:cSld>
-  <p:clrMapOvr>
-    <a:masterClrMapping/>
-  </p:clrMapOvr>
-  <p:timing>
-    <p:tnLst>
-      <p:par>
-        <p:cTn id="1" dur="indefinite" restart="never" nodeType="tmRoot"/>
-      </p:par>
-    </p:tnLst>
-  </p:timing>
-</p:sld>
-</file>
-
-<file path=ppt/slides/slide6.xml><?xml version="1.0" encoding="utf-8"?>
-<p:sld xmlns:a="http://schemas.openxmlformats.org/drawingml/2006/main" xmlns:r="http://schemas.openxmlformats.org/officeDocument/2006/relationships" xmlns:p="http://schemas.openxmlformats.org/presentationml/2006/main">
-  <p:cSld>
-    <p:spTree>
-      <p:nvGrpSpPr>
-        <p:cNvPr id="1" name=""/>
-        <p:cNvGrpSpPr/>
-        <p:nvPr/>
-      </p:nvGrpSpPr>
-      <p:grpSpPr>
-        <a:xfrm>
-          <a:off x="0" y="0"/>
-          <a:ext cx="0" cy="0"/>
-          <a:chOff x="0" y="0"/>
-          <a:chExt cx="0" cy="0"/>
-        </a:xfrm>
-      </p:grpSpPr>
-      <p:sp>
-        <p:nvSpPr>
-          <p:cNvPr id="2" name="Title 1"/>
-          <p:cNvSpPr>
-            <a:spLocks noGrp="1"/>
-          </p:cNvSpPr>
-          <p:nvPr>
-            <p:ph type="title"/>
-          </p:nvPr>
-        </p:nvSpPr>
-        <p:spPr/>
-        <p:txBody>
-          <a:bodyPr/>
-          <a:lstStyle/>
-          <a:p>
-            <a:r>
-              <a:rPr lang="en-US" dirty="0"/>
-              <a:t>Large-scale structure</a:t>
-            </a:r>
-          </a:p>
-        </p:txBody>
-      </p:sp>
-      <p:sp>
-        <p:nvSpPr>
-          <p:cNvPr id="3" name="Content Placeholder 2"/>
-          <p:cNvSpPr>
-            <a:spLocks noGrp="1"/>
-          </p:cNvSpPr>
-          <p:nvPr>
-            <p:ph idx="1"/>
-          </p:nvPr>
-        </p:nvSpPr>
-        <p:spPr/>
-        <p:txBody>
-          <a:bodyPr/>
-          <a:lstStyle/>
-          <a:p>
-            <a:r>
-              <a:rPr lang="en-US" dirty="0"/>
-              <a:t>system metaphor</a:t>
-            </a:r>
-          </a:p>
-          <a:p>
-            <a:r>
-              <a:rPr lang="en-US" dirty="0"/>
-              <a:t>responsibility layers </a:t>
-            </a:r>
-          </a:p>
-          <a:p>
-            <a:r>
-              <a:rPr lang="en-US" dirty="0"/>
-              <a:t>knowledge level</a:t>
-            </a:r>
-          </a:p>
-        </p:txBody>
-      </p:sp>
-    </p:spTree>
-    <p:extLst>
-      <p:ext uri="{BB962C8B-B14F-4D97-AF65-F5344CB8AC3E}">
-        <p14:creationId xmlns:p14="http://schemas.microsoft.com/office/powerpoint/2010/main" val="144652331"/>
-      </p:ext>
-    </p:extLst>
-  </p:cSld>
-  <p:clrMapOvr>
-    <a:masterClrMapping/>
-  </p:clrMapOvr>
-  <p:timing>
-    <p:tnLst>
-      <p:par>
-        <p:cTn id="1" dur="indefinite" restart="never" nodeType="tmRoot"/>
-      </p:par>
-    </p:tnLst>
+    <p:bldLst>
+      <p:bldP spid="3" grpId="0" uiExpand="1" build="p"/>
+    </p:bldLst>
   </p:timing>
 </p:sld>
 </file>
@@ -4537,7 +5046,13 @@
       </p:grpSpPr>
       <p:sp>
         <p:nvSpPr>
-          <p:cNvPr id="2" name="Title 1"/>
+          <p:cNvPr id="2" name="Title 1">
+            <a:extLst>
+              <a:ext uri="{FF2B5EF4-FFF2-40B4-BE49-F238E27FC236}">
+                <a16:creationId xmlns:a16="http://schemas.microsoft.com/office/drawing/2014/main" id="{8ED481A9-1B97-488D-8E15-06B37EE6901D}"/>
+              </a:ext>
+            </a:extLst>
+          </p:cNvPr>
           <p:cNvSpPr>
             <a:spLocks noGrp="1"/>
           </p:cNvSpPr>
@@ -4552,14 +5067,21 @@
           <a:p>
             <a:r>
               <a:rPr lang="en-US" dirty="0"/>
-              <a:t>References</a:t>
-            </a:r>
-          </a:p>
-        </p:txBody>
-      </p:sp>
-      <p:sp>
-        <p:nvSpPr>
-          <p:cNvPr id="3" name="Content Placeholder 2"/>
+              <a:t>Bounded context</a:t>
+            </a:r>
+            <a:endParaRPr lang="en-NL" dirty="0"/>
+          </a:p>
+        </p:txBody>
+      </p:sp>
+      <p:sp>
+        <p:nvSpPr>
+          <p:cNvPr id="3" name="Content Placeholder 2">
+            <a:extLst>
+              <a:ext uri="{FF2B5EF4-FFF2-40B4-BE49-F238E27FC236}">
+                <a16:creationId xmlns:a16="http://schemas.microsoft.com/office/drawing/2014/main" id="{EA753C1B-34B6-4416-B6C8-768D4791C91A}"/>
+              </a:ext>
+            </a:extLst>
+          </p:cNvPr>
           <p:cNvSpPr>
             <a:spLocks noGrp="1"/>
           </p:cNvSpPr>
@@ -4569,105 +5091,91 @@
         </p:nvSpPr>
         <p:spPr/>
         <p:txBody>
-          <a:bodyPr>
-            <a:normAutofit/>
-          </a:bodyPr>
+          <a:bodyPr/>
           <a:lstStyle/>
           <a:p>
             <a:r>
               <a:rPr lang="en-US" dirty="0"/>
-              <a:t>Building Microservices </a:t>
+              <a:t>Different departments</a:t>
             </a:r>
           </a:p>
           <a:p>
             <a:pPr lvl="1"/>
             <a:r>
               <a:rPr lang="en-US" dirty="0"/>
-              <a:t>Sam Newman</a:t>
-            </a:r>
-          </a:p>
-          <a:p>
-            <a:r>
-              <a:rPr lang="en-US" dirty="0"/>
-              <a:t>Domain Driven Design </a:t>
+              <a:t>Marketing, sales, finance</a:t>
+            </a:r>
+          </a:p>
+          <a:p>
+            <a:r>
+              <a:rPr lang="en-US" dirty="0"/>
+              <a:t>Different names for the same entity</a:t>
             </a:r>
           </a:p>
           <a:p>
             <a:pPr lvl="1"/>
             <a:r>
               <a:rPr lang="en-US" dirty="0"/>
-              <a:t>Eric Evans</a:t>
-            </a:r>
-          </a:p>
-          <a:p>
+              <a:t>Customer, recipient, account</a:t>
+            </a:r>
+          </a:p>
+          <a:p>
+            <a:r>
+              <a:rPr lang="en-US" dirty="0"/>
+              <a:t>One purpose </a:t>
+            </a:r>
+          </a:p>
+          <a:p>
+            <a:pPr lvl="1"/>
+            <a:r>
+              <a:rPr lang="en-US" dirty="0"/>
+              <a:t>(ending with –</a:t>
+            </a:r>
             <a:r>
               <a:rPr lang="en-US" dirty="0" err="1"/>
-              <a:t>Microservice</a:t>
-            </a:r>
-            <a:r>
-              <a:rPr lang="en-US" dirty="0"/>
-              <a:t> Architecture </a:t>
+              <a:t>ing</a:t>
+            </a:r>
+            <a:r>
+              <a:rPr lang="en-US" dirty="0"/>
+              <a:t> or –</a:t>
+            </a:r>
+            <a:r>
+              <a:rPr lang="en-US" dirty="0" err="1"/>
+              <a:t>tion</a:t>
+            </a:r>
+            <a:r>
+              <a:rPr lang="en-US" dirty="0"/>
+              <a:t>)</a:t>
+            </a:r>
+          </a:p>
+          <a:p>
+            <a:r>
+              <a:rPr lang="en-US" dirty="0"/>
+              <a:t>Default contexts</a:t>
             </a:r>
           </a:p>
           <a:p>
             <a:pPr lvl="1"/>
             <a:r>
-              <a:rPr lang="en-US" dirty="0" err="1"/>
-              <a:t>Irakli</a:t>
-            </a:r>
-            <a:r>
-              <a:rPr lang="en-US" dirty="0"/>
-              <a:t> </a:t>
-            </a:r>
-            <a:r>
-              <a:rPr lang="en-US" dirty="0" err="1"/>
-              <a:t>Nadareishvili</a:t>
-            </a:r>
-            <a:r>
-              <a:rPr lang="en-US" dirty="0"/>
-              <a:t>, Ronnie </a:t>
-            </a:r>
-            <a:r>
-              <a:rPr lang="en-US" dirty="0" err="1"/>
-              <a:t>Mitra</a:t>
-            </a:r>
-            <a:r>
-              <a:rPr lang="en-US" dirty="0"/>
-              <a:t>, Matt McLarty &amp; Mike Amundsen </a:t>
-            </a:r>
-          </a:p>
-          <a:p>
-            <a:r>
-              <a:rPr lang="en-US" dirty="0"/>
-              <a:t>Microservices for Java Developers </a:t>
-            </a:r>
-          </a:p>
-          <a:p>
-            <a:pPr lvl="1"/>
-            <a:r>
-              <a:rPr lang="en-US" dirty="0"/>
-              <a:t>Christian Posta</a:t>
-            </a:r>
+              <a:rPr lang="en-US" dirty="0"/>
+              <a:t>Shipping, billing, searching, reporting, marketing</a:t>
+            </a:r>
+          </a:p>
+          <a:p>
+            <a:endParaRPr lang="en-NL" dirty="0"/>
           </a:p>
         </p:txBody>
       </p:sp>
     </p:spTree>
     <p:extLst>
       <p:ext uri="{BB962C8B-B14F-4D97-AF65-F5344CB8AC3E}">
-        <p14:creationId xmlns:p14="http://schemas.microsoft.com/office/powerpoint/2010/main" val="4194221761"/>
+        <p14:creationId xmlns:p14="http://schemas.microsoft.com/office/powerpoint/2010/main" val="1088852012"/>
       </p:ext>
     </p:extLst>
   </p:cSld>
   <p:clrMapOvr>
     <a:masterClrMapping/>
   </p:clrMapOvr>
-  <p:timing>
-    <p:tnLst>
-      <p:par>
-        <p:cTn id="1" dur="indefinite" restart="never" nodeType="tmRoot"/>
-      </p:par>
-    </p:tnLst>
-  </p:timing>
 </p:sld>
 </file>
 
@@ -4704,8 +5212,8 @@
           <a:lstStyle/>
           <a:p>
             <a:r>
-              <a:rPr lang="nl-NL" dirty="0"/>
-              <a:t>Set Rules</a:t>
+              <a:rPr lang="en-US" dirty="0"/>
+              <a:t>References (books)</a:t>
             </a:r>
           </a:p>
         </p:txBody>
@@ -4723,108 +5231,261 @@
         <p:spPr/>
         <p:txBody>
           <a:bodyPr>
-            <a:normAutofit lnSpcReduction="10000"/>
+            <a:normAutofit/>
           </a:bodyPr>
           <a:lstStyle/>
           <a:p>
             <a:r>
-              <a:rPr lang="nl-NL" dirty="0"/>
-              <a:t>Each card has four properties</a:t>
+              <a:rPr lang="en-US" dirty="0"/>
+              <a:t>Building Microservices </a:t>
             </a:r>
           </a:p>
           <a:p>
             <a:pPr lvl="1"/>
             <a:r>
-              <a:rPr lang="nl-NL" dirty="0"/>
-              <a:t>Quantity: 1, 2 or 3</a:t>
+              <a:rPr lang="en-US" dirty="0"/>
+              <a:t>Sam Newman</a:t>
+            </a:r>
+          </a:p>
+          <a:p>
+            <a:r>
+              <a:rPr lang="en-US" dirty="0"/>
+              <a:t>Domain Driven Design </a:t>
             </a:r>
           </a:p>
           <a:p>
             <a:pPr lvl="1"/>
             <a:r>
-              <a:rPr lang="nl-NL" dirty="0"/>
-              <a:t>Colour: red, blue or green</a:t>
+              <a:rPr lang="en-US" dirty="0"/>
+              <a:t>Eric Evans</a:t>
+            </a:r>
+          </a:p>
+          <a:p>
+            <a:r>
+              <a:rPr lang="en-US" dirty="0"/>
+              <a:t>Microservice Architecture </a:t>
             </a:r>
           </a:p>
           <a:p>
             <a:pPr lvl="1"/>
             <a:r>
-              <a:rPr lang="nl-NL" dirty="0"/>
-              <a:t>Shape: heart, ellipse or square</a:t>
+              <a:rPr lang="en-US" dirty="0"/>
+              <a:t>Irakli </a:t>
+            </a:r>
+            <a:r>
+              <a:rPr lang="en-US" dirty="0" err="1"/>
+              <a:t>Nadareishvili</a:t>
+            </a:r>
+            <a:r>
+              <a:rPr lang="en-US" dirty="0"/>
+              <a:t>, Ronnie Mitra, Matt McLarty &amp; Mike Amundsen </a:t>
+            </a:r>
+          </a:p>
+          <a:p>
+            <a:r>
+              <a:rPr lang="en-US" dirty="0"/>
+              <a:t>Microservices for Java Developers </a:t>
             </a:r>
           </a:p>
           <a:p>
             <a:pPr lvl="1"/>
             <a:r>
-              <a:rPr lang="nl-NL" dirty="0"/>
-              <a:t>Filling: open, shaded, full</a:t>
-            </a:r>
-          </a:p>
-          <a:p>
-            <a:r>
-              <a:rPr lang="nl-NL" dirty="0"/>
-              <a:t>12 card form a board</a:t>
-            </a:r>
-          </a:p>
-          <a:p>
-            <a:r>
-              <a:rPr lang="nl-NL" dirty="0"/>
-              <a:t>3 cards form a set, if any given property</a:t>
-            </a:r>
-          </a:p>
-          <a:p>
-            <a:pPr lvl="1"/>
-            <a:r>
-              <a:rPr lang="nl-NL" dirty="0"/>
-              <a:t>Is equal for all three cards (3x red)</a:t>
-            </a:r>
-          </a:p>
-          <a:p>
-            <a:pPr lvl="1"/>
-            <a:r>
-              <a:rPr lang="nl-NL" dirty="0"/>
-              <a:t>Is unequal for all three cards (red, blue and green)</a:t>
-            </a:r>
-          </a:p>
-          <a:p>
-            <a:r>
-              <a:rPr lang="nl-NL" dirty="0"/>
-              <a:t>If no set can be found, 3 extra cards are added</a:t>
-            </a:r>
-          </a:p>
-          <a:p>
-            <a:r>
-              <a:rPr lang="nl-NL" dirty="0"/>
-              <a:t>The game is over when all cards are drawn and no </a:t>
-            </a:r>
-            <a:r>
-              <a:rPr lang="nl-NL"/>
-              <a:t>more sets can be found</a:t>
-            </a:r>
-            <a:endParaRPr lang="nl-NL" dirty="0"/>
-          </a:p>
-          <a:p>
-            <a:endParaRPr lang="nl-NL" dirty="0"/>
+              <a:rPr lang="en-US" dirty="0"/>
+              <a:t>Christian Posta</a:t>
+            </a:r>
           </a:p>
         </p:txBody>
       </p:sp>
     </p:spTree>
     <p:extLst>
       <p:ext uri="{BB962C8B-B14F-4D97-AF65-F5344CB8AC3E}">
-        <p14:creationId xmlns:p14="http://schemas.microsoft.com/office/powerpoint/2010/main" val="1757863826"/>
+        <p14:creationId xmlns:p14="http://schemas.microsoft.com/office/powerpoint/2010/main" val="4194221761"/>
       </p:ext>
     </p:extLst>
   </p:cSld>
   <p:clrMapOvr>
     <a:masterClrMapping/>
   </p:clrMapOvr>
-  <p:timing>
-    <p:tnLst>
-      <p:par>
-        <p:cTn id="1" dur="indefinite" restart="never" nodeType="tmRoot"/>
-      </p:par>
-    </p:tnLst>
-  </p:timing>
+</p:sld>
+</file>
+
+<file path=ppt/slides/slide9.xml><?xml version="1.0" encoding="utf-8"?>
+<p:sld xmlns:a="http://schemas.openxmlformats.org/drawingml/2006/main" xmlns:r="http://schemas.openxmlformats.org/officeDocument/2006/relationships" xmlns:p="http://schemas.openxmlformats.org/presentationml/2006/main">
+  <p:cSld>
+    <p:spTree>
+      <p:nvGrpSpPr>
+        <p:cNvPr id="1" name=""/>
+        <p:cNvGrpSpPr/>
+        <p:nvPr/>
+      </p:nvGrpSpPr>
+      <p:grpSpPr>
+        <a:xfrm>
+          <a:off x="0" y="0"/>
+          <a:ext cx="0" cy="0"/>
+          <a:chOff x="0" y="0"/>
+          <a:chExt cx="0" cy="0"/>
+        </a:xfrm>
+      </p:grpSpPr>
+      <p:sp>
+        <p:nvSpPr>
+          <p:cNvPr id="2" name="Title 1"/>
+          <p:cNvSpPr>
+            <a:spLocks noGrp="1"/>
+          </p:cNvSpPr>
+          <p:nvPr>
+            <p:ph type="title"/>
+          </p:nvPr>
+        </p:nvSpPr>
+        <p:spPr/>
+        <p:txBody>
+          <a:bodyPr/>
+          <a:lstStyle/>
+          <a:p>
+            <a:r>
+              <a:rPr lang="en-US" dirty="0"/>
+              <a:t>References (presentations)</a:t>
+            </a:r>
+          </a:p>
+        </p:txBody>
+      </p:sp>
+      <p:sp>
+        <p:nvSpPr>
+          <p:cNvPr id="3" name="Content Placeholder 2"/>
+          <p:cNvSpPr>
+            <a:spLocks noGrp="1"/>
+          </p:cNvSpPr>
+          <p:nvPr>
+            <p:ph idx="1"/>
+          </p:nvPr>
+        </p:nvSpPr>
+        <p:spPr/>
+        <p:txBody>
+          <a:bodyPr>
+            <a:normAutofit/>
+          </a:bodyPr>
+          <a:lstStyle/>
+          <a:p>
+            <a:r>
+              <a:rPr lang="en-US" dirty="0"/>
+              <a:t>Splitting up a problem into microservices</a:t>
+            </a:r>
+          </a:p>
+          <a:p>
+            <a:pPr lvl="1"/>
+            <a:r>
+              <a:rPr lang="en-US" dirty="0"/>
+              <a:t>Erik </a:t>
+            </a:r>
+            <a:r>
+              <a:rPr lang="en-US" dirty="0" err="1"/>
+              <a:t>Talboom</a:t>
+            </a:r>
+            <a:r>
+              <a:rPr lang="en-US" dirty="0"/>
+              <a:t> &amp; Koen </a:t>
+            </a:r>
+            <a:r>
+              <a:rPr lang="en-US" dirty="0" err="1"/>
+              <a:t>Metsu</a:t>
+            </a:r>
+            <a:endParaRPr lang="en-US" dirty="0"/>
+          </a:p>
+          <a:p>
+            <a:pPr fontAlgn="base"/>
+            <a:r>
+              <a:rPr lang="en-US" dirty="0"/>
+              <a:t>From </a:t>
+            </a:r>
+            <a:r>
+              <a:rPr lang="en-US" dirty="0" err="1"/>
+              <a:t>eventstorming</a:t>
+            </a:r>
+            <a:r>
+              <a:rPr lang="en-US" dirty="0"/>
+              <a:t> to </a:t>
+            </a:r>
+            <a:r>
+              <a:rPr lang="en-US" dirty="0" err="1"/>
+              <a:t>CoDDDing</a:t>
+            </a:r>
+            <a:r>
+              <a:rPr lang="en-US" dirty="0"/>
+              <a:t> </a:t>
+            </a:r>
+          </a:p>
+          <a:p>
+            <a:pPr lvl="1" fontAlgn="base"/>
+            <a:r>
+              <a:rPr lang="en-US" dirty="0"/>
+              <a:t>Kenny Baas-</a:t>
+            </a:r>
+            <a:r>
+              <a:rPr lang="en-US" dirty="0" err="1"/>
+              <a:t>Schwegler</a:t>
+            </a:r>
+            <a:r>
+              <a:rPr lang="en-US" dirty="0"/>
+              <a:t> &amp; João Rosa</a:t>
+            </a:r>
+            <a:br>
+              <a:rPr lang="en-US" dirty="0"/>
+            </a:br>
+            <a:r>
+              <a:rPr lang="en-US" dirty="0">
+                <a:hlinkClick r:id="rId2"/>
+              </a:rPr>
+              <a:t>https://www.youtube.com/watch?v=g4NqI9r25B0</a:t>
+            </a:r>
+            <a:endParaRPr lang="en-US" dirty="0"/>
+          </a:p>
+          <a:p>
+            <a:pPr fontAlgn="base"/>
+            <a:r>
+              <a:rPr lang="en-US" dirty="0"/>
+              <a:t>Hexagonal at Scale, with DDD and microservices! </a:t>
+            </a:r>
+          </a:p>
+          <a:p>
+            <a:pPr lvl="1" fontAlgn="base"/>
+            <a:r>
+              <a:rPr lang="en-US" dirty="0" err="1"/>
+              <a:t>Cyrille</a:t>
+            </a:r>
+            <a:r>
+              <a:rPr lang="en-US" dirty="0"/>
+              <a:t> </a:t>
+            </a:r>
+            <a:r>
+              <a:rPr lang="en-US" dirty="0" err="1"/>
+              <a:t>Martraire</a:t>
+            </a:r>
+            <a:r>
+              <a:rPr lang="en-US" dirty="0"/>
+              <a:t> </a:t>
+            </a:r>
+            <a:br>
+              <a:rPr lang="en-US" dirty="0"/>
+            </a:br>
+            <a:r>
+              <a:rPr lang="en-US" u="sng" dirty="0">
+                <a:hlinkClick r:id="rId3"/>
+              </a:rPr>
+              <a:t>https://www.youtube.com/watch?v=xZOO_CksS-E&amp;t=5s</a:t>
+            </a:r>
+            <a:endParaRPr lang="en-US" u="sng" dirty="0"/>
+          </a:p>
+        </p:txBody>
+      </p:sp>
+    </p:spTree>
+    <p:extLst>
+      <p:ext uri="{BB962C8B-B14F-4D97-AF65-F5344CB8AC3E}">
+        <p14:creationId xmlns:p14="http://schemas.microsoft.com/office/powerpoint/2010/main" val="4247696838"/>
+      </p:ext>
+    </p:extLst>
+  </p:cSld>
+  <p:clrMapOvr>
+    <a:masterClrMapping/>
+  </p:clrMapOvr>
 </p:sld>
 </file>
 
@@ -5402,7 +6063,7 @@
   <a:extraClrSchemeLst/>
   <a:extLst>
     <a:ext uri="{05A4C25C-085E-4340-85A3-A5531E510DB2}">
-      <thm15:themeFamily xmlns:thm15="http://schemas.microsoft.com/office/thememl/2012/main" xmlns="" name="Office Theme" id="{62F939B6-93AF-4DB8-9C6B-D6C7DFDC589F}" vid="{4A3C46E8-61CC-4603-A589-7422A47A8E4A}"/>
+      <thm15:themeFamily xmlns:thm15="http://schemas.microsoft.com/office/thememl/2012/main" name="Office Theme" id="{62F939B6-93AF-4DB8-9C6B-D6C7DFDC589F}" vid="{4A3C46E8-61CC-4603-A589-7422A47A8E4A}"/>
     </a:ext>
   </a:extLst>
 </a:theme>
@@ -5697,7 +6358,7 @@
   <a:extraClrSchemeLst/>
   <a:extLst>
     <a:ext uri="{05A4C25C-085E-4340-85A3-A5531E510DB2}">
-      <thm15:themeFamily xmlns:thm15="http://schemas.microsoft.com/office/thememl/2012/main" xmlns="" name="Office Theme" id="{62F939B6-93AF-4DB8-9C6B-D6C7DFDC589F}" vid="{4A3C46E8-61CC-4603-A589-7422A47A8E4A}"/>
+      <thm15:themeFamily xmlns:thm15="http://schemas.microsoft.com/office/thememl/2012/main" name="Office Theme" id="{62F939B6-93AF-4DB8-9C6B-D6C7DFDC589F}" vid="{4A3C46E8-61CC-4603-A589-7422A47A8E4A}"/>
     </a:ext>
   </a:extLst>
 </a:theme>

</xml_diff>